<commit_message>
Wireframes geaddet und bearbeitet, pictures/Logo.png hinzugefügt BULMA Prototyping bearbeitet
</commit_message>
<xml_diff>
--- a/App_Vorstellung_Folien.pptx
+++ b/App_Vorstellung_Folien.pptx
@@ -4,9 +4,14 @@
   <p:sldMasterIdLst>
     <p:sldMasterId id="2147483648" r:id="rId1"/>
   </p:sldMasterIdLst>
+  <p:handoutMasterIdLst>
+    <p:handoutMasterId r:id="rId6"/>
+  </p:handoutMasterIdLst>
   <p:sldIdLst>
     <p:sldId id="262" r:id="rId2"/>
     <p:sldId id="263" r:id="rId3"/>
+    <p:sldId id="264" r:id="rId4"/>
+    <p:sldId id="265" r:id="rId5"/>
   </p:sldIdLst>
   <p:sldSz cx="12192000" cy="6858000"/>
   <p:notesSz cx="6858000" cy="9144000"/>
@@ -105,7 +110,199 @@
       </a:defRPr>
     </a:lvl9pPr>
   </p:defaultTextStyle>
+  <p:extLst>
+    <p:ext uri="{EFAFB233-063F-42B5-8137-9DF3F51BA10A}">
+      <p15:sldGuideLst xmlns:p15="http://schemas.microsoft.com/office/powerpoint/2012/main"/>
+    </p:ext>
+    <p:ext uri="{2D200454-40CA-4A62-9FC3-DE9A4176ACB9}">
+      <p15:notesGuideLst xmlns:p15="http://schemas.microsoft.com/office/powerpoint/2012/main"/>
+    </p:ext>
+  </p:extLst>
 </p:presentation>
+</file>
+
+<file path=ppt/handoutMasters/handoutMaster1.xml><?xml version="1.0" encoding="utf-8"?>
+<p:handoutMaster xmlns:a="http://schemas.openxmlformats.org/drawingml/2006/main" xmlns:r="http://schemas.openxmlformats.org/officeDocument/2006/relationships" xmlns:p="http://schemas.openxmlformats.org/presentationml/2006/main">
+  <p:cSld>
+    <p:bg>
+      <p:bgRef idx="1001">
+        <a:schemeClr val="bg1"/>
+      </p:bgRef>
+    </p:bg>
+    <p:spTree>
+      <p:nvGrpSpPr>
+        <p:cNvPr id="1" name=""/>
+        <p:cNvGrpSpPr/>
+        <p:nvPr/>
+      </p:nvGrpSpPr>
+      <p:grpSpPr>
+        <a:xfrm>
+          <a:off x="0" y="0"/>
+          <a:ext cx="0" cy="0"/>
+          <a:chOff x="0" y="0"/>
+          <a:chExt cx="0" cy="0"/>
+        </a:xfrm>
+      </p:grpSpPr>
+      <p:sp>
+        <p:nvSpPr>
+          <p:cNvPr id="2" name="Kopfzeilenplatzhalter 1">
+            <a:extLst>
+              <a:ext uri="{FF2B5EF4-FFF2-40B4-BE49-F238E27FC236}">
+                <a16:creationId xmlns:a16="http://schemas.microsoft.com/office/drawing/2014/main" id="{635A7C38-0262-4B8A-95F1-DB53C25E56A4}"/>
+              </a:ext>
+            </a:extLst>
+          </p:cNvPr>
+          <p:cNvSpPr>
+            <a:spLocks noGrp="1"/>
+          </p:cNvSpPr>
+          <p:nvPr>
+            <p:ph type="hdr" sz="quarter"/>
+          </p:nvPr>
+        </p:nvSpPr>
+        <p:spPr>
+          <a:xfrm>
+            <a:off x="0" y="0"/>
+            <a:ext cx="2971800" cy="458788"/>
+          </a:xfrm>
+          <a:prstGeom prst="rect">
+            <a:avLst/>
+          </a:prstGeom>
+        </p:spPr>
+        <p:txBody>
+          <a:bodyPr vert="horz" lIns="91440" tIns="45720" rIns="91440" bIns="45720" rtlCol="0"/>
+          <a:lstStyle>
+            <a:lvl1pPr algn="l">
+              <a:defRPr sz="1200"/>
+            </a:lvl1pPr>
+          </a:lstStyle>
+          <a:p>
+            <a:endParaRPr lang="de-AT"/>
+          </a:p>
+        </p:txBody>
+      </p:sp>
+      <p:sp>
+        <p:nvSpPr>
+          <p:cNvPr id="3" name="Datumsplatzhalter 2">
+            <a:extLst>
+              <a:ext uri="{FF2B5EF4-FFF2-40B4-BE49-F238E27FC236}">
+                <a16:creationId xmlns:a16="http://schemas.microsoft.com/office/drawing/2014/main" id="{97AEE8B2-C708-48F1-887B-247B358556A8}"/>
+              </a:ext>
+            </a:extLst>
+          </p:cNvPr>
+          <p:cNvSpPr>
+            <a:spLocks noGrp="1"/>
+          </p:cNvSpPr>
+          <p:nvPr>
+            <p:ph type="dt" sz="quarter" idx="1"/>
+          </p:nvPr>
+        </p:nvSpPr>
+        <p:spPr>
+          <a:xfrm>
+            <a:off x="3884613" y="0"/>
+            <a:ext cx="2971800" cy="458788"/>
+          </a:xfrm>
+          <a:prstGeom prst="rect">
+            <a:avLst/>
+          </a:prstGeom>
+        </p:spPr>
+        <p:txBody>
+          <a:bodyPr vert="horz" lIns="91440" tIns="45720" rIns="91440" bIns="45720" rtlCol="0"/>
+          <a:lstStyle>
+            <a:lvl1pPr algn="r">
+              <a:defRPr sz="1200"/>
+            </a:lvl1pPr>
+          </a:lstStyle>
+          <a:p>
+            <a:fld id="{9116E161-33FB-4845-A9C6-C4B29EEC57DE}" type="datetimeFigureOut">
+              <a:rPr lang="de-AT" smtClean="0"/>
+              <a:t>18.10.2019</a:t>
+            </a:fld>
+            <a:endParaRPr lang="de-AT"/>
+          </a:p>
+        </p:txBody>
+      </p:sp>
+      <p:sp>
+        <p:nvSpPr>
+          <p:cNvPr id="4" name="Fußzeilenplatzhalter 3">
+            <a:extLst>
+              <a:ext uri="{FF2B5EF4-FFF2-40B4-BE49-F238E27FC236}">
+                <a16:creationId xmlns:a16="http://schemas.microsoft.com/office/drawing/2014/main" id="{1BAFF411-F034-4B29-B0BC-60560EC674A6}"/>
+              </a:ext>
+            </a:extLst>
+          </p:cNvPr>
+          <p:cNvSpPr>
+            <a:spLocks noGrp="1"/>
+          </p:cNvSpPr>
+          <p:nvPr>
+            <p:ph type="ftr" sz="quarter" idx="2"/>
+          </p:nvPr>
+        </p:nvSpPr>
+        <p:spPr>
+          <a:xfrm>
+            <a:off x="0" y="8685213"/>
+            <a:ext cx="2971800" cy="458787"/>
+          </a:xfrm>
+          <a:prstGeom prst="rect">
+            <a:avLst/>
+          </a:prstGeom>
+        </p:spPr>
+        <p:txBody>
+          <a:bodyPr vert="horz" lIns="91440" tIns="45720" rIns="91440" bIns="45720" rtlCol="0" anchor="b"/>
+          <a:lstStyle>
+            <a:lvl1pPr algn="l">
+              <a:defRPr sz="1200"/>
+            </a:lvl1pPr>
+          </a:lstStyle>
+          <a:p>
+            <a:endParaRPr lang="de-AT"/>
+          </a:p>
+        </p:txBody>
+      </p:sp>
+      <p:sp>
+        <p:nvSpPr>
+          <p:cNvPr id="5" name="Foliennummernplatzhalter 4">
+            <a:extLst>
+              <a:ext uri="{FF2B5EF4-FFF2-40B4-BE49-F238E27FC236}">
+                <a16:creationId xmlns:a16="http://schemas.microsoft.com/office/drawing/2014/main" id="{9815472E-63D5-45E7-AA1E-ED437B631A42}"/>
+              </a:ext>
+            </a:extLst>
+          </p:cNvPr>
+          <p:cNvSpPr>
+            <a:spLocks noGrp="1"/>
+          </p:cNvSpPr>
+          <p:nvPr>
+            <p:ph type="sldNum" sz="quarter" idx="3"/>
+          </p:nvPr>
+        </p:nvSpPr>
+        <p:spPr>
+          <a:xfrm>
+            <a:off x="3884613" y="8685213"/>
+            <a:ext cx="2971800" cy="458787"/>
+          </a:xfrm>
+          <a:prstGeom prst="rect">
+            <a:avLst/>
+          </a:prstGeom>
+        </p:spPr>
+        <p:txBody>
+          <a:bodyPr vert="horz" lIns="91440" tIns="45720" rIns="91440" bIns="45720" rtlCol="0" anchor="b"/>
+          <a:lstStyle>
+            <a:lvl1pPr algn="r">
+              <a:defRPr sz="1200"/>
+            </a:lvl1pPr>
+          </a:lstStyle>
+          <a:p>
+            <a:fld id="{414B0EF1-03ED-4BB1-ADDD-5DD285C0BB80}" type="slidenum">
+              <a:rPr lang="de-AT" smtClean="0"/>
+              <a:t>‹Nr.›</a:t>
+            </a:fld>
+            <a:endParaRPr lang="de-AT"/>
+          </a:p>
+        </p:txBody>
+      </p:sp>
+    </p:spTree>
+  </p:cSld>
+  <p:clrMap bg1="lt1" tx1="dk1" bg2="lt2" tx2="dk2" accent1="accent1" accent2="accent2" accent3="accent3" accent4="accent4" accent5="accent5" accent6="accent6" hlink="hlink" folHlink="folHlink"/>
+</p:handoutMaster>
 </file>
 
 <file path=ppt/slideLayouts/slideLayout1.xml><?xml version="1.0" encoding="utf-8"?>
@@ -257,7 +454,7 @@
           <a:p>
             <a:fld id="{36057CF0-97FE-4195-B002-11B66D9E0DA9}" type="datetimeFigureOut">
               <a:rPr lang="de-AT" smtClean="0"/>
-              <a:t>11.10.2019</a:t>
+              <a:t>18.10.2019</a:t>
             </a:fld>
             <a:endParaRPr lang="de-AT"/>
           </a:p>
@@ -457,7 +654,7 @@
           <a:p>
             <a:fld id="{36057CF0-97FE-4195-B002-11B66D9E0DA9}" type="datetimeFigureOut">
               <a:rPr lang="de-AT" smtClean="0"/>
-              <a:t>11.10.2019</a:t>
+              <a:t>18.10.2019</a:t>
             </a:fld>
             <a:endParaRPr lang="de-AT"/>
           </a:p>
@@ -667,7 +864,7 @@
           <a:p>
             <a:fld id="{36057CF0-97FE-4195-B002-11B66D9E0DA9}" type="datetimeFigureOut">
               <a:rPr lang="de-AT" smtClean="0"/>
-              <a:t>11.10.2019</a:t>
+              <a:t>18.10.2019</a:t>
             </a:fld>
             <a:endParaRPr lang="de-AT"/>
           </a:p>
@@ -867,7 +1064,7 @@
           <a:p>
             <a:fld id="{36057CF0-97FE-4195-B002-11B66D9E0DA9}" type="datetimeFigureOut">
               <a:rPr lang="de-AT" smtClean="0"/>
-              <a:t>11.10.2019</a:t>
+              <a:t>18.10.2019</a:t>
             </a:fld>
             <a:endParaRPr lang="de-AT"/>
           </a:p>
@@ -1143,7 +1340,7 @@
           <a:p>
             <a:fld id="{36057CF0-97FE-4195-B002-11B66D9E0DA9}" type="datetimeFigureOut">
               <a:rPr lang="de-AT" smtClean="0"/>
-              <a:t>11.10.2019</a:t>
+              <a:t>18.10.2019</a:t>
             </a:fld>
             <a:endParaRPr lang="de-AT"/>
           </a:p>
@@ -1411,7 +1608,7 @@
           <a:p>
             <a:fld id="{36057CF0-97FE-4195-B002-11B66D9E0DA9}" type="datetimeFigureOut">
               <a:rPr lang="de-AT" smtClean="0"/>
-              <a:t>11.10.2019</a:t>
+              <a:t>18.10.2019</a:t>
             </a:fld>
             <a:endParaRPr lang="de-AT"/>
           </a:p>
@@ -1826,7 +2023,7 @@
           <a:p>
             <a:fld id="{36057CF0-97FE-4195-B002-11B66D9E0DA9}" type="datetimeFigureOut">
               <a:rPr lang="de-AT" smtClean="0"/>
-              <a:t>11.10.2019</a:t>
+              <a:t>18.10.2019</a:t>
             </a:fld>
             <a:endParaRPr lang="de-AT"/>
           </a:p>
@@ -1968,7 +2165,7 @@
           <a:p>
             <a:fld id="{36057CF0-97FE-4195-B002-11B66D9E0DA9}" type="datetimeFigureOut">
               <a:rPr lang="de-AT" smtClean="0"/>
-              <a:t>11.10.2019</a:t>
+              <a:t>18.10.2019</a:t>
             </a:fld>
             <a:endParaRPr lang="de-AT"/>
           </a:p>
@@ -2081,7 +2278,7 @@
           <a:p>
             <a:fld id="{36057CF0-97FE-4195-B002-11B66D9E0DA9}" type="datetimeFigureOut">
               <a:rPr lang="de-AT" smtClean="0"/>
-              <a:t>11.10.2019</a:t>
+              <a:t>18.10.2019</a:t>
             </a:fld>
             <a:endParaRPr lang="de-AT"/>
           </a:p>
@@ -2394,7 +2591,7 @@
           <a:p>
             <a:fld id="{36057CF0-97FE-4195-B002-11B66D9E0DA9}" type="datetimeFigureOut">
               <a:rPr lang="de-AT" smtClean="0"/>
-              <a:t>11.10.2019</a:t>
+              <a:t>18.10.2019</a:t>
             </a:fld>
             <a:endParaRPr lang="de-AT"/>
           </a:p>
@@ -2683,7 +2880,7 @@
           <a:p>
             <a:fld id="{36057CF0-97FE-4195-B002-11B66D9E0DA9}" type="datetimeFigureOut">
               <a:rPr lang="de-AT" smtClean="0"/>
-              <a:t>11.10.2019</a:t>
+              <a:t>18.10.2019</a:t>
             </a:fld>
             <a:endParaRPr lang="de-AT"/>
           </a:p>
@@ -2926,7 +3123,7 @@
           <a:p>
             <a:fld id="{36057CF0-97FE-4195-B002-11B66D9E0DA9}" type="datetimeFigureOut">
               <a:rPr lang="de-AT" smtClean="0"/>
-              <a:t>11.10.2019</a:t>
+              <a:t>18.10.2019</a:t>
             </a:fld>
             <a:endParaRPr lang="de-AT"/>
           </a:p>
@@ -3371,8 +3568,8 @@
         </p:nvSpPr>
         <p:spPr>
           <a:xfrm>
-            <a:off x="3833944" y="349135"/>
-            <a:ext cx="4580313" cy="6151418"/>
+            <a:off x="3740727" y="349134"/>
+            <a:ext cx="4673531" cy="6234545"/>
           </a:xfrm>
           <a:prstGeom prst="rect">
             <a:avLst/>
@@ -3380,6 +3577,11 @@
           <a:solidFill>
             <a:srgbClr val="585858"/>
           </a:solidFill>
+          <a:ln>
+            <a:solidFill>
+              <a:srgbClr val="000000"/>
+            </a:solidFill>
+          </a:ln>
         </p:spPr>
         <p:style>
           <a:lnRef idx="2">
@@ -4007,8 +4209,8 @@
         </p:nvSpPr>
         <p:spPr>
           <a:xfrm>
-            <a:off x="3833944" y="349135"/>
-            <a:ext cx="4580313" cy="6151418"/>
+            <a:off x="3736084" y="368095"/>
+            <a:ext cx="4673530" cy="6251170"/>
           </a:xfrm>
           <a:prstGeom prst="rect">
             <a:avLst/>
@@ -4016,6 +4218,11 @@
           <a:solidFill>
             <a:srgbClr val="585858"/>
           </a:solidFill>
+          <a:ln>
+            <a:solidFill>
+              <a:srgbClr val="000000"/>
+            </a:solidFill>
+          </a:ln>
         </p:spPr>
         <p:style>
           <a:lnRef idx="2">
@@ -4349,7 +4556,7 @@
         </p:blipFill>
         <p:spPr>
           <a:xfrm>
-            <a:off x="5176004" y="402673"/>
+            <a:off x="5147903" y="409988"/>
             <a:ext cx="1896194" cy="912680"/>
           </a:xfrm>
           <a:prstGeom prst="rect">
@@ -4371,8 +4578,8 @@
         </p:nvSpPr>
         <p:spPr>
           <a:xfrm>
-            <a:off x="3807229" y="1343952"/>
-            <a:ext cx="4572000" cy="5164913"/>
+            <a:off x="3740685" y="1237599"/>
+            <a:ext cx="4673530" cy="5423559"/>
           </a:xfrm>
           <a:prstGeom prst="rect">
             <a:avLst/>
@@ -4381,8 +4588,8 @@
           <a:ln>
             <a:solidFill>
               <a:schemeClr val="tx1">
-                <a:lumMod val="65000"/>
-                <a:lumOff val="35000"/>
+                <a:lumMod val="95000"/>
+                <a:lumOff val="5000"/>
               </a:schemeClr>
             </a:solidFill>
           </a:ln>
@@ -4589,6 +4796,1795 @@
     <p:extLst>
       <p:ext uri="{BB962C8B-B14F-4D97-AF65-F5344CB8AC3E}">
         <p14:creationId xmlns:p14="http://schemas.microsoft.com/office/powerpoint/2010/main" val="1083070590"/>
+      </p:ext>
+    </p:extLst>
+  </p:cSld>
+  <p:clrMapOvr>
+    <a:masterClrMapping/>
+  </p:clrMapOvr>
+</p:sld>
+</file>
+
+<file path=ppt/slides/slide3.xml><?xml version="1.0" encoding="utf-8"?>
+<p:sld xmlns:a="http://schemas.openxmlformats.org/drawingml/2006/main" xmlns:r="http://schemas.openxmlformats.org/officeDocument/2006/relationships" xmlns:p="http://schemas.openxmlformats.org/presentationml/2006/main">
+  <p:cSld>
+    <p:bg>
+      <p:bgPr>
+        <a:blipFill dpi="0" rotWithShape="1">
+          <a:blip r:embed="rId2">
+            <a:lum/>
+          </a:blip>
+          <a:srcRect/>
+          <a:stretch>
+            <a:fillRect t="-21000" b="-22000"/>
+          </a:stretch>
+        </a:blipFill>
+        <a:effectLst/>
+      </p:bgPr>
+    </p:bg>
+    <p:spTree>
+      <p:nvGrpSpPr>
+        <p:cNvPr id="1" name=""/>
+        <p:cNvGrpSpPr/>
+        <p:nvPr/>
+      </p:nvGrpSpPr>
+      <p:grpSpPr>
+        <a:xfrm>
+          <a:off x="0" y="0"/>
+          <a:ext cx="0" cy="0"/>
+          <a:chOff x="0" y="0"/>
+          <a:chExt cx="0" cy="0"/>
+        </a:xfrm>
+      </p:grpSpPr>
+      <p:sp>
+        <p:nvSpPr>
+          <p:cNvPr id="6" name="Rechteck 5">
+            <a:extLst>
+              <a:ext uri="{FF2B5EF4-FFF2-40B4-BE49-F238E27FC236}">
+                <a16:creationId xmlns:a16="http://schemas.microsoft.com/office/drawing/2014/main" id="{F5796293-4F7C-4C3E-A4F8-3EF840533E0F}"/>
+              </a:ext>
+            </a:extLst>
+          </p:cNvPr>
+          <p:cNvSpPr/>
+          <p:nvPr/>
+        </p:nvSpPr>
+        <p:spPr>
+          <a:xfrm>
+            <a:off x="3708470" y="349134"/>
+            <a:ext cx="4673530" cy="6251170"/>
+          </a:xfrm>
+          <a:prstGeom prst="rect">
+            <a:avLst/>
+          </a:prstGeom>
+          <a:gradFill flip="none" rotWithShape="1">
+            <a:gsLst>
+              <a:gs pos="0">
+                <a:srgbClr val="585858">
+                  <a:shade val="30000"/>
+                  <a:satMod val="115000"/>
+                </a:srgbClr>
+              </a:gs>
+              <a:gs pos="50000">
+                <a:srgbClr val="585858">
+                  <a:shade val="67500"/>
+                  <a:satMod val="115000"/>
+                </a:srgbClr>
+              </a:gs>
+              <a:gs pos="100000">
+                <a:srgbClr val="585858">
+                  <a:shade val="100000"/>
+                  <a:satMod val="115000"/>
+                </a:srgbClr>
+              </a:gs>
+            </a:gsLst>
+            <a:path path="circle">
+              <a:fillToRect t="100000" r="100000"/>
+            </a:path>
+            <a:tileRect l="-100000" b="-100000"/>
+          </a:gradFill>
+          <a:ln>
+            <a:solidFill>
+              <a:schemeClr val="tx1"/>
+            </a:solidFill>
+          </a:ln>
+        </p:spPr>
+        <p:style>
+          <a:lnRef idx="2">
+            <a:schemeClr val="accent1">
+              <a:shade val="50000"/>
+            </a:schemeClr>
+          </a:lnRef>
+          <a:fillRef idx="1">
+            <a:schemeClr val="accent1"/>
+          </a:fillRef>
+          <a:effectRef idx="0">
+            <a:schemeClr val="accent1"/>
+          </a:effectRef>
+          <a:fontRef idx="minor">
+            <a:schemeClr val="lt1"/>
+          </a:fontRef>
+        </p:style>
+        <p:txBody>
+          <a:bodyPr rtlCol="0" anchor="ctr"/>
+          <a:lstStyle/>
+          <a:p>
+            <a:pPr algn="ctr"/>
+            <a:endParaRPr lang="de-AT" dirty="0"/>
+          </a:p>
+        </p:txBody>
+      </p:sp>
+      <p:sp>
+        <p:nvSpPr>
+          <p:cNvPr id="9" name="Textfeld 8">
+            <a:extLst>
+              <a:ext uri="{FF2B5EF4-FFF2-40B4-BE49-F238E27FC236}">
+                <a16:creationId xmlns:a16="http://schemas.microsoft.com/office/drawing/2014/main" id="{01AAB0B9-0988-40D6-8950-AA061742B092}"/>
+              </a:ext>
+            </a:extLst>
+          </p:cNvPr>
+          <p:cNvSpPr txBox="1"/>
+          <p:nvPr/>
+        </p:nvSpPr>
+        <p:spPr>
+          <a:xfrm>
+            <a:off x="3932234" y="1372129"/>
+            <a:ext cx="1836106" cy="369332"/>
+          </a:xfrm>
+          <a:prstGeom prst="rect">
+            <a:avLst/>
+          </a:prstGeom>
+          <a:noFill/>
+        </p:spPr>
+        <p:txBody>
+          <a:bodyPr wrap="square" rtlCol="0">
+            <a:spAutoFit/>
+          </a:bodyPr>
+          <a:lstStyle/>
+          <a:p>
+            <a:r>
+              <a:rPr lang="de-AT" u="sng" dirty="0"/>
+              <a:t>Amazon Prime:</a:t>
+            </a:r>
+          </a:p>
+        </p:txBody>
+      </p:sp>
+      <p:pic>
+        <p:nvPicPr>
+          <p:cNvPr id="1026" name="Picture 2" descr="Bildergebnis für breaking bad logo">
+            <a:extLst>
+              <a:ext uri="{FF2B5EF4-FFF2-40B4-BE49-F238E27FC236}">
+                <a16:creationId xmlns:a16="http://schemas.microsoft.com/office/drawing/2014/main" id="{DA141A80-A080-46AC-8FF6-FDD3A30166CD}"/>
+              </a:ext>
+            </a:extLst>
+          </p:cNvPr>
+          <p:cNvPicPr>
+            <a:picLocks noChangeAspect="1" noChangeArrowheads="1"/>
+          </p:cNvPicPr>
+          <p:nvPr/>
+        </p:nvPicPr>
+        <p:blipFill>
+          <a:blip r:embed="rId3">
+            <a:extLst>
+              <a:ext uri="{28A0092B-C50C-407E-A947-70E740481C1C}">
+                <a14:useLocalDpi xmlns:a14="http://schemas.microsoft.com/office/drawing/2010/main" val="0"/>
+              </a:ext>
+            </a:extLst>
+          </a:blip>
+          <a:srcRect/>
+          <a:stretch>
+            <a:fillRect/>
+          </a:stretch>
+        </p:blipFill>
+        <p:spPr bwMode="auto">
+          <a:xfrm>
+            <a:off x="4195358" y="1982852"/>
+            <a:ext cx="921631" cy="1063943"/>
+          </a:xfrm>
+          <a:prstGeom prst="rect">
+            <a:avLst/>
+          </a:prstGeom>
+          <a:noFill/>
+          <a:extLst>
+            <a:ext uri="{909E8E84-426E-40DD-AFC4-6F175D3DCCD1}">
+              <a14:hiddenFill xmlns:a14="http://schemas.microsoft.com/office/drawing/2010/main">
+                <a:solidFill>
+                  <a:srgbClr val="FFFFFF"/>
+                </a:solidFill>
+              </a14:hiddenFill>
+            </a:ext>
+          </a:extLst>
+        </p:spPr>
+      </p:pic>
+      <p:pic>
+        <p:nvPicPr>
+          <p:cNvPr id="1032" name="Picture 8" descr="Bildergebnis für walking dead logo">
+            <a:extLst>
+              <a:ext uri="{FF2B5EF4-FFF2-40B4-BE49-F238E27FC236}">
+                <a16:creationId xmlns:a16="http://schemas.microsoft.com/office/drawing/2014/main" id="{D627057C-4C91-469D-9123-B3025C0B2BF4}"/>
+              </a:ext>
+            </a:extLst>
+          </p:cNvPr>
+          <p:cNvPicPr>
+            <a:picLocks noChangeAspect="1" noChangeArrowheads="1"/>
+          </p:cNvPicPr>
+          <p:nvPr/>
+        </p:nvPicPr>
+        <p:blipFill rotWithShape="1">
+          <a:blip r:embed="rId4">
+            <a:extLst>
+              <a:ext uri="{28A0092B-C50C-407E-A947-70E740481C1C}">
+                <a14:useLocalDpi xmlns:a14="http://schemas.microsoft.com/office/drawing/2010/main" val="0"/>
+              </a:ext>
+            </a:extLst>
+          </a:blip>
+          <a:srcRect/>
+          <a:stretch/>
+        </p:blipFill>
+        <p:spPr bwMode="auto">
+          <a:xfrm>
+            <a:off x="5478402" y="1978930"/>
+            <a:ext cx="921631" cy="1063943"/>
+          </a:xfrm>
+          <a:prstGeom prst="rect">
+            <a:avLst/>
+          </a:prstGeom>
+          <a:noFill/>
+          <a:extLst>
+            <a:ext uri="{909E8E84-426E-40DD-AFC4-6F175D3DCCD1}">
+              <a14:hiddenFill xmlns:a14="http://schemas.microsoft.com/office/drawing/2010/main">
+                <a:solidFill>
+                  <a:srgbClr val="FFFFFF"/>
+                </a:solidFill>
+              </a14:hiddenFill>
+            </a:ext>
+          </a:extLst>
+        </p:spPr>
+      </p:pic>
+      <p:sp>
+        <p:nvSpPr>
+          <p:cNvPr id="20" name="Textfeld 19">
+            <a:extLst>
+              <a:ext uri="{FF2B5EF4-FFF2-40B4-BE49-F238E27FC236}">
+                <a16:creationId xmlns:a16="http://schemas.microsoft.com/office/drawing/2014/main" id="{11697197-888C-4948-9814-55389082D342}"/>
+              </a:ext>
+            </a:extLst>
+          </p:cNvPr>
+          <p:cNvSpPr txBox="1"/>
+          <p:nvPr/>
+        </p:nvSpPr>
+        <p:spPr>
+          <a:xfrm>
+            <a:off x="4114692" y="3108960"/>
+            <a:ext cx="921631" cy="769441"/>
+          </a:xfrm>
+          <a:prstGeom prst="rect">
+            <a:avLst/>
+          </a:prstGeom>
+          <a:noFill/>
+        </p:spPr>
+        <p:txBody>
+          <a:bodyPr wrap="square" rtlCol="0">
+            <a:spAutoFit/>
+          </a:bodyPr>
+          <a:lstStyle/>
+          <a:p>
+            <a:pPr marL="285750" indent="-285750">
+              <a:buFont typeface="Arial" panose="020B0604020202020204" pitchFamily="34" charset="0"/>
+              <a:buChar char="•"/>
+            </a:pPr>
+            <a:r>
+              <a:rPr lang="de-AT" sz="1100" dirty="0"/>
+              <a:t>Netflix</a:t>
+            </a:r>
+          </a:p>
+          <a:p>
+            <a:pPr marL="285750" indent="-285750">
+              <a:buFont typeface="Arial" panose="020B0604020202020204" pitchFamily="34" charset="0"/>
+              <a:buChar char="•"/>
+            </a:pPr>
+            <a:endParaRPr lang="de-AT" sz="1100" dirty="0"/>
+          </a:p>
+          <a:p>
+            <a:pPr marL="285750" indent="-285750">
+              <a:buFont typeface="Arial" panose="020B0604020202020204" pitchFamily="34" charset="0"/>
+              <a:buChar char="•"/>
+            </a:pPr>
+            <a:r>
+              <a:rPr lang="de-AT" sz="1100" dirty="0"/>
+              <a:t>Drama/ Krimi</a:t>
+            </a:r>
+          </a:p>
+        </p:txBody>
+      </p:sp>
+      <p:sp>
+        <p:nvSpPr>
+          <p:cNvPr id="22" name="Textfeld 21">
+            <a:extLst>
+              <a:ext uri="{FF2B5EF4-FFF2-40B4-BE49-F238E27FC236}">
+                <a16:creationId xmlns:a16="http://schemas.microsoft.com/office/drawing/2014/main" id="{01FE92B1-7543-4038-AB6E-BD7BA72DE18C}"/>
+              </a:ext>
+            </a:extLst>
+          </p:cNvPr>
+          <p:cNvSpPr txBox="1"/>
+          <p:nvPr/>
+        </p:nvSpPr>
+        <p:spPr>
+          <a:xfrm>
+            <a:off x="5390359" y="3108960"/>
+            <a:ext cx="1387207" cy="769441"/>
+          </a:xfrm>
+          <a:prstGeom prst="rect">
+            <a:avLst/>
+          </a:prstGeom>
+          <a:noFill/>
+        </p:spPr>
+        <p:txBody>
+          <a:bodyPr wrap="square" rtlCol="0">
+            <a:spAutoFit/>
+          </a:bodyPr>
+          <a:lstStyle/>
+          <a:p>
+            <a:pPr marL="285750" indent="-285750">
+              <a:buFont typeface="Arial" panose="020B0604020202020204" pitchFamily="34" charset="0"/>
+              <a:buChar char="•"/>
+            </a:pPr>
+            <a:r>
+              <a:rPr lang="de-AT" sz="1100" dirty="0"/>
+              <a:t>Amazon  Prime/ Netflix</a:t>
+            </a:r>
+          </a:p>
+          <a:p>
+            <a:pPr marL="285750" indent="-285750">
+              <a:buFont typeface="Arial" panose="020B0604020202020204" pitchFamily="34" charset="0"/>
+              <a:buChar char="•"/>
+            </a:pPr>
+            <a:r>
+              <a:rPr lang="de-AT" sz="1100" dirty="0"/>
+              <a:t>Drama / Science Fiction</a:t>
+            </a:r>
+          </a:p>
+        </p:txBody>
+      </p:sp>
+      <p:pic>
+        <p:nvPicPr>
+          <p:cNvPr id="1036" name="Picture 12" descr="Bildergebnis für burger menu icon">
+            <a:extLst>
+              <a:ext uri="{FF2B5EF4-FFF2-40B4-BE49-F238E27FC236}">
+                <a16:creationId xmlns:a16="http://schemas.microsoft.com/office/drawing/2014/main" id="{A5FBDAFD-9853-4BAA-9007-A91053BD26ED}"/>
+              </a:ext>
+            </a:extLst>
+          </p:cNvPr>
+          <p:cNvPicPr>
+            <a:picLocks noChangeAspect="1" noChangeArrowheads="1"/>
+          </p:cNvPicPr>
+          <p:nvPr/>
+        </p:nvPicPr>
+        <p:blipFill>
+          <a:blip r:embed="rId5">
+            <a:extLst>
+              <a:ext uri="{28A0092B-C50C-407E-A947-70E740481C1C}">
+                <a14:useLocalDpi xmlns:a14="http://schemas.microsoft.com/office/drawing/2010/main" val="0"/>
+              </a:ext>
+            </a:extLst>
+          </a:blip>
+          <a:srcRect/>
+          <a:stretch>
+            <a:fillRect/>
+          </a:stretch>
+        </p:blipFill>
+        <p:spPr bwMode="auto">
+          <a:xfrm>
+            <a:off x="7764449" y="547366"/>
+            <a:ext cx="551520" cy="551520"/>
+          </a:xfrm>
+          <a:prstGeom prst="rect">
+            <a:avLst/>
+          </a:prstGeom>
+          <a:noFill/>
+          <a:extLst>
+            <a:ext uri="{909E8E84-426E-40DD-AFC4-6F175D3DCCD1}">
+              <a14:hiddenFill xmlns:a14="http://schemas.microsoft.com/office/drawing/2010/main">
+                <a:solidFill>
+                  <a:srgbClr val="FFFFFF"/>
+                </a:solidFill>
+              </a14:hiddenFill>
+            </a:ext>
+          </a:extLst>
+        </p:spPr>
+      </p:pic>
+      <p:pic>
+        <p:nvPicPr>
+          <p:cNvPr id="25" name="Grafik 24" descr="Ein Bild, das sitzend, Tisch, Front, erleuchtet enthält.&#10;&#10;Automatisch generierte Beschreibung">
+            <a:extLst>
+              <a:ext uri="{FF2B5EF4-FFF2-40B4-BE49-F238E27FC236}">
+                <a16:creationId xmlns:a16="http://schemas.microsoft.com/office/drawing/2014/main" id="{D1FF613F-2235-46F5-BEB1-0622A5A9B812}"/>
+              </a:ext>
+            </a:extLst>
+          </p:cNvPr>
+          <p:cNvPicPr>
+            <a:picLocks noChangeAspect="1"/>
+          </p:cNvPicPr>
+          <p:nvPr/>
+        </p:nvPicPr>
+        <p:blipFill>
+          <a:blip r:embed="rId6">
+            <a:extLst>
+              <a:ext uri="{28A0092B-C50C-407E-A947-70E740481C1C}">
+                <a14:useLocalDpi xmlns:a14="http://schemas.microsoft.com/office/drawing/2010/main" val="0"/>
+              </a:ext>
+            </a:extLst>
+          </a:blip>
+          <a:stretch>
+            <a:fillRect/>
+          </a:stretch>
+        </p:blipFill>
+        <p:spPr>
+          <a:xfrm>
+            <a:off x="5176004" y="402673"/>
+            <a:ext cx="1896194" cy="912680"/>
+          </a:xfrm>
+          <a:prstGeom prst="rect">
+            <a:avLst/>
+          </a:prstGeom>
+        </p:spPr>
+      </p:pic>
+      <p:sp>
+        <p:nvSpPr>
+          <p:cNvPr id="26" name="Rechteck 25">
+            <a:extLst>
+              <a:ext uri="{FF2B5EF4-FFF2-40B4-BE49-F238E27FC236}">
+                <a16:creationId xmlns:a16="http://schemas.microsoft.com/office/drawing/2014/main" id="{B553BEA2-CC6A-4279-A928-9479A4906143}"/>
+              </a:ext>
+            </a:extLst>
+          </p:cNvPr>
+          <p:cNvSpPr/>
+          <p:nvPr/>
+        </p:nvSpPr>
+        <p:spPr>
+          <a:xfrm>
+            <a:off x="3810000" y="1238597"/>
+            <a:ext cx="4572000" cy="5361684"/>
+          </a:xfrm>
+          <a:prstGeom prst="rect">
+            <a:avLst/>
+          </a:prstGeom>
+          <a:noFill/>
+          <a:ln>
+            <a:solidFill>
+              <a:srgbClr val="000000"/>
+            </a:solidFill>
+          </a:ln>
+        </p:spPr>
+        <p:style>
+          <a:lnRef idx="2">
+            <a:schemeClr val="accent1">
+              <a:shade val="50000"/>
+            </a:schemeClr>
+          </a:lnRef>
+          <a:fillRef idx="1">
+            <a:schemeClr val="accent1"/>
+          </a:fillRef>
+          <a:effectRef idx="0">
+            <a:schemeClr val="accent1"/>
+          </a:effectRef>
+          <a:fontRef idx="minor">
+            <a:schemeClr val="lt1"/>
+          </a:fontRef>
+        </p:style>
+        <p:txBody>
+          <a:bodyPr rtlCol="0" anchor="ctr"/>
+          <a:lstStyle/>
+          <a:p>
+            <a:pPr algn="ctr"/>
+            <a:endParaRPr lang="de-AT"/>
+          </a:p>
+        </p:txBody>
+      </p:sp>
+      <p:cxnSp>
+        <p:nvCxnSpPr>
+          <p:cNvPr id="28" name="Gerade Verbindung mit Pfeil 27">
+            <a:extLst>
+              <a:ext uri="{FF2B5EF4-FFF2-40B4-BE49-F238E27FC236}">
+                <a16:creationId xmlns:a16="http://schemas.microsoft.com/office/drawing/2014/main" id="{0A6C5913-1CE7-4142-8A20-E78247C041ED}"/>
+              </a:ext>
+            </a:extLst>
+          </p:cNvPr>
+          <p:cNvCxnSpPr/>
+          <p:nvPr/>
+        </p:nvCxnSpPr>
+        <p:spPr>
+          <a:xfrm>
+            <a:off x="4114692" y="3878401"/>
+            <a:ext cx="3925517" cy="0"/>
+          </a:xfrm>
+          <a:prstGeom prst="straightConnector1">
+            <a:avLst/>
+          </a:prstGeom>
+          <a:ln>
+            <a:headEnd type="triangle"/>
+            <a:tailEnd type="triangle"/>
+          </a:ln>
+        </p:spPr>
+        <p:style>
+          <a:lnRef idx="1">
+            <a:schemeClr val="dk1"/>
+          </a:lnRef>
+          <a:fillRef idx="0">
+            <a:schemeClr val="dk1"/>
+          </a:fillRef>
+          <a:effectRef idx="0">
+            <a:schemeClr val="dk1"/>
+          </a:effectRef>
+          <a:fontRef idx="minor">
+            <a:schemeClr val="tx1"/>
+          </a:fontRef>
+        </p:style>
+      </p:cxnSp>
+      <p:pic>
+        <p:nvPicPr>
+          <p:cNvPr id="1044" name="Picture 20" descr="Bildergebnis für Elite">
+            <a:extLst>
+              <a:ext uri="{FF2B5EF4-FFF2-40B4-BE49-F238E27FC236}">
+                <a16:creationId xmlns:a16="http://schemas.microsoft.com/office/drawing/2014/main" id="{31B6F2C0-87FA-41AF-A19E-1E81ED9834AC}"/>
+              </a:ext>
+            </a:extLst>
+          </p:cNvPr>
+          <p:cNvPicPr>
+            <a:picLocks noChangeAspect="1" noChangeArrowheads="1"/>
+          </p:cNvPicPr>
+          <p:nvPr/>
+        </p:nvPicPr>
+        <p:blipFill>
+          <a:blip r:embed="rId7">
+            <a:extLst>
+              <a:ext uri="{28A0092B-C50C-407E-A947-70E740481C1C}">
+                <a14:useLocalDpi xmlns:a14="http://schemas.microsoft.com/office/drawing/2010/main" val="0"/>
+              </a:ext>
+            </a:extLst>
+          </a:blip>
+          <a:srcRect/>
+          <a:stretch>
+            <a:fillRect/>
+          </a:stretch>
+        </p:blipFill>
+        <p:spPr bwMode="auto">
+          <a:xfrm>
+            <a:off x="7072198" y="2016417"/>
+            <a:ext cx="717091" cy="1063944"/>
+          </a:xfrm>
+          <a:prstGeom prst="rect">
+            <a:avLst/>
+          </a:prstGeom>
+          <a:noFill/>
+          <a:extLst>
+            <a:ext uri="{909E8E84-426E-40DD-AFC4-6F175D3DCCD1}">
+              <a14:hiddenFill xmlns:a14="http://schemas.microsoft.com/office/drawing/2010/main">
+                <a:solidFill>
+                  <a:srgbClr val="FFFFFF"/>
+                </a:solidFill>
+              </a14:hiddenFill>
+            </a:ext>
+          </a:extLst>
+        </p:spPr>
+      </p:pic>
+      <p:sp>
+        <p:nvSpPr>
+          <p:cNvPr id="29" name="Textfeld 28">
+            <a:extLst>
+              <a:ext uri="{FF2B5EF4-FFF2-40B4-BE49-F238E27FC236}">
+                <a16:creationId xmlns:a16="http://schemas.microsoft.com/office/drawing/2014/main" id="{734F0EFA-77A9-4627-BB2C-08ADAA46186C}"/>
+              </a:ext>
+            </a:extLst>
+          </p:cNvPr>
+          <p:cNvSpPr txBox="1"/>
+          <p:nvPr/>
+        </p:nvSpPr>
+        <p:spPr>
+          <a:xfrm>
+            <a:off x="6949440" y="3108960"/>
+            <a:ext cx="937260" cy="769441"/>
+          </a:xfrm>
+          <a:prstGeom prst="rect">
+            <a:avLst/>
+          </a:prstGeom>
+          <a:noFill/>
+        </p:spPr>
+        <p:txBody>
+          <a:bodyPr wrap="square" rtlCol="0">
+            <a:spAutoFit/>
+          </a:bodyPr>
+          <a:lstStyle/>
+          <a:p>
+            <a:pPr marL="285750" indent="-285750">
+              <a:buFont typeface="Arial" panose="020B0604020202020204" pitchFamily="34" charset="0"/>
+              <a:buChar char="•"/>
+            </a:pPr>
+            <a:r>
+              <a:rPr lang="de-AT" sz="1100" dirty="0"/>
+              <a:t>Netflix</a:t>
+            </a:r>
+          </a:p>
+          <a:p>
+            <a:pPr marL="285750" indent="-285750">
+              <a:buFont typeface="Arial" panose="020B0604020202020204" pitchFamily="34" charset="0"/>
+              <a:buChar char="•"/>
+            </a:pPr>
+            <a:endParaRPr lang="de-AT" sz="1100" dirty="0"/>
+          </a:p>
+          <a:p>
+            <a:pPr marL="285750" indent="-285750">
+              <a:buFont typeface="Arial" panose="020B0604020202020204" pitchFamily="34" charset="0"/>
+              <a:buChar char="•"/>
+            </a:pPr>
+            <a:r>
+              <a:rPr lang="de-AT" sz="1100" dirty="0"/>
+              <a:t>Drama/Krimi</a:t>
+            </a:r>
+          </a:p>
+        </p:txBody>
+      </p:sp>
+      <p:pic>
+        <p:nvPicPr>
+          <p:cNvPr id="33" name="Grafik 32">
+            <a:extLst>
+              <a:ext uri="{FF2B5EF4-FFF2-40B4-BE49-F238E27FC236}">
+                <a16:creationId xmlns:a16="http://schemas.microsoft.com/office/drawing/2014/main" id="{8A3E827C-E0C6-40DD-A175-C2FEA3F4C669}"/>
+              </a:ext>
+            </a:extLst>
+          </p:cNvPr>
+          <p:cNvPicPr>
+            <a:picLocks noChangeAspect="1"/>
+          </p:cNvPicPr>
+          <p:nvPr/>
+        </p:nvPicPr>
+        <p:blipFill>
+          <a:blip r:embed="rId8"/>
+          <a:stretch>
+            <a:fillRect/>
+          </a:stretch>
+        </p:blipFill>
+        <p:spPr>
+          <a:xfrm>
+            <a:off x="3985040" y="508442"/>
+            <a:ext cx="590467" cy="629369"/>
+          </a:xfrm>
+          <a:prstGeom prst="rect">
+            <a:avLst/>
+          </a:prstGeom>
+        </p:spPr>
+      </p:pic>
+      <p:sp>
+        <p:nvSpPr>
+          <p:cNvPr id="3" name="Textfeld 2">
+            <a:extLst>
+              <a:ext uri="{FF2B5EF4-FFF2-40B4-BE49-F238E27FC236}">
+                <a16:creationId xmlns:a16="http://schemas.microsoft.com/office/drawing/2014/main" id="{DE7B51EA-9A87-4036-8EAF-824987FD442F}"/>
+              </a:ext>
+            </a:extLst>
+          </p:cNvPr>
+          <p:cNvSpPr txBox="1"/>
+          <p:nvPr/>
+        </p:nvSpPr>
+        <p:spPr>
+          <a:xfrm>
+            <a:off x="3683355" y="349146"/>
+            <a:ext cx="2532318" cy="6251145"/>
+          </a:xfrm>
+          <a:prstGeom prst="rect">
+            <a:avLst/>
+          </a:prstGeom>
+          <a:solidFill>
+            <a:srgbClr val="585858"/>
+          </a:solidFill>
+          <a:ln w="28575">
+            <a:solidFill>
+              <a:schemeClr val="tx1"/>
+            </a:solidFill>
+          </a:ln>
+        </p:spPr>
+        <p:txBody>
+          <a:bodyPr wrap="square" rtlCol="0">
+            <a:spAutoFit/>
+          </a:bodyPr>
+          <a:lstStyle/>
+          <a:p>
+            <a:endParaRPr lang="de-AT" dirty="0"/>
+          </a:p>
+        </p:txBody>
+      </p:sp>
+      <p:sp>
+        <p:nvSpPr>
+          <p:cNvPr id="4" name="Textfeld 3">
+            <a:extLst>
+              <a:ext uri="{FF2B5EF4-FFF2-40B4-BE49-F238E27FC236}">
+                <a16:creationId xmlns:a16="http://schemas.microsoft.com/office/drawing/2014/main" id="{235F6C97-DA35-4C8D-9CE4-10FEDDAF9A30}"/>
+              </a:ext>
+            </a:extLst>
+          </p:cNvPr>
+          <p:cNvSpPr txBox="1"/>
+          <p:nvPr/>
+        </p:nvSpPr>
+        <p:spPr>
+          <a:xfrm>
+            <a:off x="3910535" y="771660"/>
+            <a:ext cx="1836106" cy="461665"/>
+          </a:xfrm>
+          <a:prstGeom prst="rect">
+            <a:avLst/>
+          </a:prstGeom>
+          <a:noFill/>
+        </p:spPr>
+        <p:txBody>
+          <a:bodyPr wrap="square" rtlCol="0">
+            <a:spAutoFit/>
+          </a:bodyPr>
+          <a:lstStyle/>
+          <a:p>
+            <a:r>
+              <a:rPr lang="de-AT" sz="2400" u="sng" dirty="0"/>
+              <a:t>Genres</a:t>
+            </a:r>
+          </a:p>
+        </p:txBody>
+      </p:sp>
+      <p:pic>
+        <p:nvPicPr>
+          <p:cNvPr id="18" name="Grafik 17">
+            <a:extLst>
+              <a:ext uri="{FF2B5EF4-FFF2-40B4-BE49-F238E27FC236}">
+                <a16:creationId xmlns:a16="http://schemas.microsoft.com/office/drawing/2014/main" id="{43DA1947-7FB0-47D0-8F83-4279C3B63403}"/>
+              </a:ext>
+            </a:extLst>
+          </p:cNvPr>
+          <p:cNvPicPr>
+            <a:picLocks noChangeAspect="1"/>
+          </p:cNvPicPr>
+          <p:nvPr/>
+        </p:nvPicPr>
+        <p:blipFill>
+          <a:blip r:embed="rId8"/>
+          <a:stretch>
+            <a:fillRect/>
+          </a:stretch>
+        </p:blipFill>
+        <p:spPr>
+          <a:xfrm flipH="1">
+            <a:off x="5348750" y="547366"/>
+            <a:ext cx="590467" cy="629369"/>
+          </a:xfrm>
+          <a:prstGeom prst="rect">
+            <a:avLst/>
+          </a:prstGeom>
+        </p:spPr>
+      </p:pic>
+      <p:sp>
+        <p:nvSpPr>
+          <p:cNvPr id="5" name="Textfeld 4">
+            <a:extLst>
+              <a:ext uri="{FF2B5EF4-FFF2-40B4-BE49-F238E27FC236}">
+                <a16:creationId xmlns:a16="http://schemas.microsoft.com/office/drawing/2014/main" id="{00DF81BB-265C-4701-B045-AE0339699003}"/>
+              </a:ext>
+            </a:extLst>
+          </p:cNvPr>
+          <p:cNvSpPr txBox="1"/>
+          <p:nvPr/>
+        </p:nvSpPr>
+        <p:spPr>
+          <a:xfrm>
+            <a:off x="3993300" y="1311877"/>
+            <a:ext cx="1546168" cy="5116785"/>
+          </a:xfrm>
+          <a:prstGeom prst="rect">
+            <a:avLst/>
+          </a:prstGeom>
+          <a:noFill/>
+        </p:spPr>
+        <p:txBody>
+          <a:bodyPr wrap="square" rtlCol="0">
+            <a:spAutoFit/>
+          </a:bodyPr>
+          <a:lstStyle/>
+          <a:p>
+            <a:pPr marL="285750" indent="-285750">
+              <a:lnSpc>
+                <a:spcPts val="2500"/>
+              </a:lnSpc>
+              <a:buFont typeface="Arial" panose="020B0604020202020204" pitchFamily="34" charset="0"/>
+              <a:buChar char="•"/>
+            </a:pPr>
+            <a:r>
+              <a:rPr lang="de-AT" sz="1400" dirty="0"/>
+              <a:t>Action</a:t>
+            </a:r>
+          </a:p>
+          <a:p>
+            <a:pPr marL="285750" indent="-285750">
+              <a:lnSpc>
+                <a:spcPts val="2500"/>
+              </a:lnSpc>
+              <a:buFont typeface="Arial" panose="020B0604020202020204" pitchFamily="34" charset="0"/>
+              <a:buChar char="•"/>
+            </a:pPr>
+            <a:r>
+              <a:rPr lang="de-AT" sz="1400" dirty="0"/>
+              <a:t>Adventure</a:t>
+            </a:r>
+          </a:p>
+          <a:p>
+            <a:pPr marL="285750" indent="-285750">
+              <a:lnSpc>
+                <a:spcPts val="2500"/>
+              </a:lnSpc>
+              <a:buFont typeface="Arial" panose="020B0604020202020204" pitchFamily="34" charset="0"/>
+              <a:buChar char="•"/>
+            </a:pPr>
+            <a:r>
+              <a:rPr lang="de-AT" sz="1400" dirty="0"/>
+              <a:t>Animation</a:t>
+            </a:r>
+          </a:p>
+          <a:p>
+            <a:pPr marL="285750" indent="-285750">
+              <a:lnSpc>
+                <a:spcPts val="2500"/>
+              </a:lnSpc>
+              <a:buFont typeface="Arial" panose="020B0604020202020204" pitchFamily="34" charset="0"/>
+              <a:buChar char="•"/>
+            </a:pPr>
+            <a:r>
+              <a:rPr lang="de-AT" sz="1400" dirty="0"/>
+              <a:t>Comedy</a:t>
+            </a:r>
+          </a:p>
+          <a:p>
+            <a:pPr marL="285750" indent="-285750">
+              <a:lnSpc>
+                <a:spcPts val="2500"/>
+              </a:lnSpc>
+              <a:buFont typeface="Arial" panose="020B0604020202020204" pitchFamily="34" charset="0"/>
+              <a:buChar char="•"/>
+            </a:pPr>
+            <a:r>
+              <a:rPr lang="de-AT" sz="1400" dirty="0"/>
+              <a:t>Crime</a:t>
+            </a:r>
+          </a:p>
+          <a:p>
+            <a:pPr marL="285750" indent="-285750">
+              <a:lnSpc>
+                <a:spcPts val="2500"/>
+              </a:lnSpc>
+              <a:buFont typeface="Arial" panose="020B0604020202020204" pitchFamily="34" charset="0"/>
+              <a:buChar char="•"/>
+            </a:pPr>
+            <a:r>
+              <a:rPr lang="de-AT" sz="1400" dirty="0"/>
+              <a:t>Drama</a:t>
+            </a:r>
+          </a:p>
+          <a:p>
+            <a:pPr marL="285750" indent="-285750">
+              <a:lnSpc>
+                <a:spcPts val="2500"/>
+              </a:lnSpc>
+              <a:buFont typeface="Arial" panose="020B0604020202020204" pitchFamily="34" charset="0"/>
+              <a:buChar char="•"/>
+            </a:pPr>
+            <a:r>
+              <a:rPr lang="de-AT" sz="1400" dirty="0"/>
+              <a:t>Fantasy</a:t>
+            </a:r>
+          </a:p>
+          <a:p>
+            <a:pPr marL="285750" indent="-285750">
+              <a:lnSpc>
+                <a:spcPts val="2500"/>
+              </a:lnSpc>
+              <a:buFont typeface="Arial" panose="020B0604020202020204" pitchFamily="34" charset="0"/>
+              <a:buChar char="•"/>
+            </a:pPr>
+            <a:r>
+              <a:rPr lang="de-AT" sz="1400" dirty="0"/>
+              <a:t>Historical</a:t>
+            </a:r>
+          </a:p>
+          <a:p>
+            <a:pPr marL="285750" indent="-285750">
+              <a:lnSpc>
+                <a:spcPts val="2500"/>
+              </a:lnSpc>
+              <a:buFont typeface="Arial" panose="020B0604020202020204" pitchFamily="34" charset="0"/>
+              <a:buChar char="•"/>
+            </a:pPr>
+            <a:r>
+              <a:rPr lang="de-AT" sz="1400" dirty="0"/>
+              <a:t>Horror</a:t>
+            </a:r>
+          </a:p>
+          <a:p>
+            <a:pPr marL="285750" indent="-285750">
+              <a:lnSpc>
+                <a:spcPts val="2500"/>
+              </a:lnSpc>
+              <a:buFont typeface="Arial" panose="020B0604020202020204" pitchFamily="34" charset="0"/>
+              <a:buChar char="•"/>
+            </a:pPr>
+            <a:r>
+              <a:rPr lang="de-AT" sz="1400" dirty="0"/>
+              <a:t>Mystery</a:t>
+            </a:r>
+          </a:p>
+          <a:p>
+            <a:pPr marL="285750" indent="-285750">
+              <a:lnSpc>
+                <a:spcPts val="2500"/>
+              </a:lnSpc>
+              <a:buFont typeface="Arial" panose="020B0604020202020204" pitchFamily="34" charset="0"/>
+              <a:buChar char="•"/>
+            </a:pPr>
+            <a:r>
+              <a:rPr lang="de-AT" sz="1400" dirty="0" err="1"/>
+              <a:t>Romance</a:t>
+            </a:r>
+            <a:endParaRPr lang="de-AT" sz="1400" dirty="0"/>
+          </a:p>
+          <a:p>
+            <a:pPr marL="285750" indent="-285750">
+              <a:lnSpc>
+                <a:spcPts val="2500"/>
+              </a:lnSpc>
+              <a:buFont typeface="Arial" panose="020B0604020202020204" pitchFamily="34" charset="0"/>
+              <a:buChar char="•"/>
+            </a:pPr>
+            <a:r>
+              <a:rPr lang="de-AT" sz="1400" dirty="0"/>
+              <a:t>Science </a:t>
+            </a:r>
+            <a:r>
+              <a:rPr lang="de-AT" sz="1400" dirty="0" err="1"/>
+              <a:t>fiction</a:t>
+            </a:r>
+            <a:endParaRPr lang="de-AT" sz="1400" dirty="0"/>
+          </a:p>
+          <a:p>
+            <a:pPr marL="285750" indent="-285750">
+              <a:lnSpc>
+                <a:spcPts val="2500"/>
+              </a:lnSpc>
+              <a:buFont typeface="Arial" panose="020B0604020202020204" pitchFamily="34" charset="0"/>
+              <a:buChar char="•"/>
+            </a:pPr>
+            <a:r>
+              <a:rPr lang="de-AT" sz="1400" dirty="0" err="1"/>
+              <a:t>Social</a:t>
+            </a:r>
+            <a:endParaRPr lang="de-AT" sz="1400" dirty="0"/>
+          </a:p>
+          <a:p>
+            <a:pPr marL="285750" indent="-285750">
+              <a:lnSpc>
+                <a:spcPts val="2500"/>
+              </a:lnSpc>
+              <a:buFont typeface="Arial" panose="020B0604020202020204" pitchFamily="34" charset="0"/>
+              <a:buChar char="•"/>
+            </a:pPr>
+            <a:r>
+              <a:rPr lang="de-AT" sz="1400" dirty="0"/>
+              <a:t>Thriller</a:t>
+            </a:r>
+          </a:p>
+          <a:p>
+            <a:pPr marL="285750" indent="-285750">
+              <a:lnSpc>
+                <a:spcPts val="2500"/>
+              </a:lnSpc>
+              <a:buFont typeface="Arial" panose="020B0604020202020204" pitchFamily="34" charset="0"/>
+              <a:buChar char="•"/>
+            </a:pPr>
+            <a:r>
+              <a:rPr lang="de-AT" sz="1400" dirty="0"/>
+              <a:t>Western</a:t>
+            </a:r>
+          </a:p>
+          <a:p>
+            <a:pPr marL="285750" indent="-285750">
+              <a:buFont typeface="Arial" panose="020B0604020202020204" pitchFamily="34" charset="0"/>
+              <a:buChar char="•"/>
+            </a:pPr>
+            <a:endParaRPr lang="de-AT" sz="1400" dirty="0"/>
+          </a:p>
+        </p:txBody>
+      </p:sp>
+    </p:spTree>
+    <p:extLst>
+      <p:ext uri="{BB962C8B-B14F-4D97-AF65-F5344CB8AC3E}">
+        <p14:creationId xmlns:p14="http://schemas.microsoft.com/office/powerpoint/2010/main" val="1535715215"/>
+      </p:ext>
+    </p:extLst>
+  </p:cSld>
+  <p:clrMapOvr>
+    <a:masterClrMapping/>
+  </p:clrMapOvr>
+</p:sld>
+</file>
+
+<file path=ppt/slides/slide4.xml><?xml version="1.0" encoding="utf-8"?>
+<p:sld xmlns:a="http://schemas.openxmlformats.org/drawingml/2006/main" xmlns:r="http://schemas.openxmlformats.org/officeDocument/2006/relationships" xmlns:p="http://schemas.openxmlformats.org/presentationml/2006/main">
+  <p:cSld>
+    <p:bg>
+      <p:bgPr>
+        <a:blipFill dpi="0" rotWithShape="1">
+          <a:blip r:embed="rId2">
+            <a:lum/>
+          </a:blip>
+          <a:srcRect/>
+          <a:stretch>
+            <a:fillRect t="-21000" b="-22000"/>
+          </a:stretch>
+        </a:blipFill>
+        <a:effectLst/>
+      </p:bgPr>
+    </p:bg>
+    <p:spTree>
+      <p:nvGrpSpPr>
+        <p:cNvPr id="1" name=""/>
+        <p:cNvGrpSpPr/>
+        <p:nvPr/>
+      </p:nvGrpSpPr>
+      <p:grpSpPr>
+        <a:xfrm>
+          <a:off x="0" y="0"/>
+          <a:ext cx="0" cy="0"/>
+          <a:chOff x="0" y="0"/>
+          <a:chExt cx="0" cy="0"/>
+        </a:xfrm>
+      </p:grpSpPr>
+      <p:sp>
+        <p:nvSpPr>
+          <p:cNvPr id="6" name="Rechteck 5">
+            <a:extLst>
+              <a:ext uri="{FF2B5EF4-FFF2-40B4-BE49-F238E27FC236}">
+                <a16:creationId xmlns:a16="http://schemas.microsoft.com/office/drawing/2014/main" id="{F5796293-4F7C-4C3E-A4F8-3EF840533E0F}"/>
+              </a:ext>
+            </a:extLst>
+          </p:cNvPr>
+          <p:cNvSpPr/>
+          <p:nvPr/>
+        </p:nvSpPr>
+        <p:spPr>
+          <a:xfrm>
+            <a:off x="3774493" y="368070"/>
+            <a:ext cx="4673530" cy="6293088"/>
+          </a:xfrm>
+          <a:prstGeom prst="rect">
+            <a:avLst/>
+          </a:prstGeom>
+          <a:solidFill>
+            <a:srgbClr val="575757"/>
+          </a:solidFill>
+          <a:ln>
+            <a:solidFill>
+              <a:srgbClr val="000000"/>
+            </a:solidFill>
+          </a:ln>
+          <a:effectLst>
+            <a:outerShdw blurRad="50800" dist="50800" dir="5400000" algn="ctr" rotWithShape="0">
+              <a:srgbClr val="555555"/>
+            </a:outerShdw>
+          </a:effectLst>
+        </p:spPr>
+        <p:style>
+          <a:lnRef idx="2">
+            <a:schemeClr val="accent1">
+              <a:shade val="50000"/>
+            </a:schemeClr>
+          </a:lnRef>
+          <a:fillRef idx="1">
+            <a:schemeClr val="accent1"/>
+          </a:fillRef>
+          <a:effectRef idx="0">
+            <a:schemeClr val="accent1"/>
+          </a:effectRef>
+          <a:fontRef idx="minor">
+            <a:schemeClr val="lt1"/>
+          </a:fontRef>
+        </p:style>
+        <p:txBody>
+          <a:bodyPr rtlCol="0" anchor="ctr"/>
+          <a:lstStyle/>
+          <a:p>
+            <a:pPr algn="ctr"/>
+            <a:endParaRPr lang="de-AT" dirty="0"/>
+          </a:p>
+        </p:txBody>
+      </p:sp>
+      <p:sp>
+        <p:nvSpPr>
+          <p:cNvPr id="9" name="Textfeld 8">
+            <a:extLst>
+              <a:ext uri="{FF2B5EF4-FFF2-40B4-BE49-F238E27FC236}">
+                <a16:creationId xmlns:a16="http://schemas.microsoft.com/office/drawing/2014/main" id="{01AAB0B9-0988-40D6-8950-AA061742B092}"/>
+              </a:ext>
+            </a:extLst>
+          </p:cNvPr>
+          <p:cNvSpPr txBox="1"/>
+          <p:nvPr/>
+        </p:nvSpPr>
+        <p:spPr>
+          <a:xfrm>
+            <a:off x="3932234" y="1372129"/>
+            <a:ext cx="1836106" cy="369332"/>
+          </a:xfrm>
+          <a:prstGeom prst="rect">
+            <a:avLst/>
+          </a:prstGeom>
+          <a:noFill/>
+        </p:spPr>
+        <p:txBody>
+          <a:bodyPr wrap="square" rtlCol="0">
+            <a:spAutoFit/>
+          </a:bodyPr>
+          <a:lstStyle/>
+          <a:p>
+            <a:r>
+              <a:rPr lang="de-AT" u="sng" dirty="0"/>
+              <a:t>Amazon Prime:</a:t>
+            </a:r>
+          </a:p>
+        </p:txBody>
+      </p:sp>
+      <p:pic>
+        <p:nvPicPr>
+          <p:cNvPr id="1026" name="Picture 2" descr="Bildergebnis für breaking bad logo">
+            <a:extLst>
+              <a:ext uri="{FF2B5EF4-FFF2-40B4-BE49-F238E27FC236}">
+                <a16:creationId xmlns:a16="http://schemas.microsoft.com/office/drawing/2014/main" id="{DA141A80-A080-46AC-8FF6-FDD3A30166CD}"/>
+              </a:ext>
+            </a:extLst>
+          </p:cNvPr>
+          <p:cNvPicPr>
+            <a:picLocks noChangeAspect="1" noChangeArrowheads="1"/>
+          </p:cNvPicPr>
+          <p:nvPr/>
+        </p:nvPicPr>
+        <p:blipFill>
+          <a:blip r:embed="rId3">
+            <a:extLst>
+              <a:ext uri="{28A0092B-C50C-407E-A947-70E740481C1C}">
+                <a14:useLocalDpi xmlns:a14="http://schemas.microsoft.com/office/drawing/2010/main" val="0"/>
+              </a:ext>
+            </a:extLst>
+          </a:blip>
+          <a:srcRect/>
+          <a:stretch>
+            <a:fillRect/>
+          </a:stretch>
+        </p:blipFill>
+        <p:spPr bwMode="auto">
+          <a:xfrm>
+            <a:off x="4195358" y="1982852"/>
+            <a:ext cx="921631" cy="1063943"/>
+          </a:xfrm>
+          <a:prstGeom prst="rect">
+            <a:avLst/>
+          </a:prstGeom>
+          <a:noFill/>
+          <a:extLst>
+            <a:ext uri="{909E8E84-426E-40DD-AFC4-6F175D3DCCD1}">
+              <a14:hiddenFill xmlns:a14="http://schemas.microsoft.com/office/drawing/2010/main">
+                <a:solidFill>
+                  <a:srgbClr val="FFFFFF"/>
+                </a:solidFill>
+              </a14:hiddenFill>
+            </a:ext>
+          </a:extLst>
+        </p:spPr>
+      </p:pic>
+      <p:pic>
+        <p:nvPicPr>
+          <p:cNvPr id="1032" name="Picture 8" descr="Bildergebnis für walking dead logo">
+            <a:extLst>
+              <a:ext uri="{FF2B5EF4-FFF2-40B4-BE49-F238E27FC236}">
+                <a16:creationId xmlns:a16="http://schemas.microsoft.com/office/drawing/2014/main" id="{D627057C-4C91-469D-9123-B3025C0B2BF4}"/>
+              </a:ext>
+            </a:extLst>
+          </p:cNvPr>
+          <p:cNvPicPr>
+            <a:picLocks noChangeAspect="1" noChangeArrowheads="1"/>
+          </p:cNvPicPr>
+          <p:nvPr/>
+        </p:nvPicPr>
+        <p:blipFill rotWithShape="1">
+          <a:blip r:embed="rId4">
+            <a:extLst>
+              <a:ext uri="{28A0092B-C50C-407E-A947-70E740481C1C}">
+                <a14:useLocalDpi xmlns:a14="http://schemas.microsoft.com/office/drawing/2010/main" val="0"/>
+              </a:ext>
+            </a:extLst>
+          </a:blip>
+          <a:srcRect/>
+          <a:stretch/>
+        </p:blipFill>
+        <p:spPr bwMode="auto">
+          <a:xfrm>
+            <a:off x="5478402" y="1978930"/>
+            <a:ext cx="921631" cy="1063943"/>
+          </a:xfrm>
+          <a:prstGeom prst="rect">
+            <a:avLst/>
+          </a:prstGeom>
+          <a:noFill/>
+          <a:extLst>
+            <a:ext uri="{909E8E84-426E-40DD-AFC4-6F175D3DCCD1}">
+              <a14:hiddenFill xmlns:a14="http://schemas.microsoft.com/office/drawing/2010/main">
+                <a:solidFill>
+                  <a:srgbClr val="FFFFFF"/>
+                </a:solidFill>
+              </a14:hiddenFill>
+            </a:ext>
+          </a:extLst>
+        </p:spPr>
+      </p:pic>
+      <p:sp>
+        <p:nvSpPr>
+          <p:cNvPr id="20" name="Textfeld 19">
+            <a:extLst>
+              <a:ext uri="{FF2B5EF4-FFF2-40B4-BE49-F238E27FC236}">
+                <a16:creationId xmlns:a16="http://schemas.microsoft.com/office/drawing/2014/main" id="{11697197-888C-4948-9814-55389082D342}"/>
+              </a:ext>
+            </a:extLst>
+          </p:cNvPr>
+          <p:cNvSpPr txBox="1"/>
+          <p:nvPr/>
+        </p:nvSpPr>
+        <p:spPr>
+          <a:xfrm>
+            <a:off x="4114692" y="3108960"/>
+            <a:ext cx="921631" cy="769441"/>
+          </a:xfrm>
+          <a:prstGeom prst="rect">
+            <a:avLst/>
+          </a:prstGeom>
+          <a:noFill/>
+        </p:spPr>
+        <p:txBody>
+          <a:bodyPr wrap="square" rtlCol="0">
+            <a:spAutoFit/>
+          </a:bodyPr>
+          <a:lstStyle/>
+          <a:p>
+            <a:pPr marL="285750" indent="-285750">
+              <a:buFont typeface="Arial" panose="020B0604020202020204" pitchFamily="34" charset="0"/>
+              <a:buChar char="•"/>
+            </a:pPr>
+            <a:r>
+              <a:rPr lang="de-AT" sz="1100" dirty="0"/>
+              <a:t>Netflix</a:t>
+            </a:r>
+          </a:p>
+          <a:p>
+            <a:pPr marL="285750" indent="-285750">
+              <a:buFont typeface="Arial" panose="020B0604020202020204" pitchFamily="34" charset="0"/>
+              <a:buChar char="•"/>
+            </a:pPr>
+            <a:endParaRPr lang="de-AT" sz="1100" dirty="0"/>
+          </a:p>
+          <a:p>
+            <a:pPr marL="285750" indent="-285750">
+              <a:buFont typeface="Arial" panose="020B0604020202020204" pitchFamily="34" charset="0"/>
+              <a:buChar char="•"/>
+            </a:pPr>
+            <a:r>
+              <a:rPr lang="de-AT" sz="1100" dirty="0"/>
+              <a:t>Drama/ Krimi</a:t>
+            </a:r>
+          </a:p>
+        </p:txBody>
+      </p:sp>
+      <p:sp>
+        <p:nvSpPr>
+          <p:cNvPr id="22" name="Textfeld 21">
+            <a:extLst>
+              <a:ext uri="{FF2B5EF4-FFF2-40B4-BE49-F238E27FC236}">
+                <a16:creationId xmlns:a16="http://schemas.microsoft.com/office/drawing/2014/main" id="{01FE92B1-7543-4038-AB6E-BD7BA72DE18C}"/>
+              </a:ext>
+            </a:extLst>
+          </p:cNvPr>
+          <p:cNvSpPr txBox="1"/>
+          <p:nvPr/>
+        </p:nvSpPr>
+        <p:spPr>
+          <a:xfrm>
+            <a:off x="5390359" y="3108960"/>
+            <a:ext cx="1387207" cy="769441"/>
+          </a:xfrm>
+          <a:prstGeom prst="rect">
+            <a:avLst/>
+          </a:prstGeom>
+          <a:noFill/>
+        </p:spPr>
+        <p:txBody>
+          <a:bodyPr wrap="square" rtlCol="0">
+            <a:spAutoFit/>
+          </a:bodyPr>
+          <a:lstStyle/>
+          <a:p>
+            <a:pPr marL="285750" indent="-285750">
+              <a:buFont typeface="Arial" panose="020B0604020202020204" pitchFamily="34" charset="0"/>
+              <a:buChar char="•"/>
+            </a:pPr>
+            <a:r>
+              <a:rPr lang="de-AT" sz="1100" dirty="0"/>
+              <a:t>Amazon  Prime/ Netflix</a:t>
+            </a:r>
+          </a:p>
+          <a:p>
+            <a:pPr marL="285750" indent="-285750">
+              <a:buFont typeface="Arial" panose="020B0604020202020204" pitchFamily="34" charset="0"/>
+              <a:buChar char="•"/>
+            </a:pPr>
+            <a:r>
+              <a:rPr lang="de-AT" sz="1100" dirty="0"/>
+              <a:t>Drama / Science Fiction</a:t>
+            </a:r>
+          </a:p>
+        </p:txBody>
+      </p:sp>
+      <p:pic>
+        <p:nvPicPr>
+          <p:cNvPr id="1036" name="Picture 12" descr="Bildergebnis für burger menu icon">
+            <a:extLst>
+              <a:ext uri="{FF2B5EF4-FFF2-40B4-BE49-F238E27FC236}">
+                <a16:creationId xmlns:a16="http://schemas.microsoft.com/office/drawing/2014/main" id="{A5FBDAFD-9853-4BAA-9007-A91053BD26ED}"/>
+              </a:ext>
+            </a:extLst>
+          </p:cNvPr>
+          <p:cNvPicPr>
+            <a:picLocks noChangeAspect="1" noChangeArrowheads="1"/>
+          </p:cNvPicPr>
+          <p:nvPr/>
+        </p:nvPicPr>
+        <p:blipFill>
+          <a:blip r:embed="rId5">
+            <a:extLst>
+              <a:ext uri="{28A0092B-C50C-407E-A947-70E740481C1C}">
+                <a14:useLocalDpi xmlns:a14="http://schemas.microsoft.com/office/drawing/2010/main" val="0"/>
+              </a:ext>
+            </a:extLst>
+          </a:blip>
+          <a:srcRect/>
+          <a:stretch>
+            <a:fillRect/>
+          </a:stretch>
+        </p:blipFill>
+        <p:spPr bwMode="auto">
+          <a:xfrm>
+            <a:off x="7764449" y="547366"/>
+            <a:ext cx="551520" cy="551520"/>
+          </a:xfrm>
+          <a:prstGeom prst="rect">
+            <a:avLst/>
+          </a:prstGeom>
+          <a:noFill/>
+          <a:extLst>
+            <a:ext uri="{909E8E84-426E-40DD-AFC4-6F175D3DCCD1}">
+              <a14:hiddenFill xmlns:a14="http://schemas.microsoft.com/office/drawing/2010/main">
+                <a:solidFill>
+                  <a:srgbClr val="FFFFFF"/>
+                </a:solidFill>
+              </a14:hiddenFill>
+            </a:ext>
+          </a:extLst>
+        </p:spPr>
+      </p:pic>
+      <p:pic>
+        <p:nvPicPr>
+          <p:cNvPr id="25" name="Grafik 24" descr="Ein Bild, das sitzend, Tisch, Front, erleuchtet enthält.&#10;&#10;Automatisch generierte Beschreibung">
+            <a:extLst>
+              <a:ext uri="{FF2B5EF4-FFF2-40B4-BE49-F238E27FC236}">
+                <a16:creationId xmlns:a16="http://schemas.microsoft.com/office/drawing/2014/main" id="{D1FF613F-2235-46F5-BEB1-0622A5A9B812}"/>
+              </a:ext>
+            </a:extLst>
+          </p:cNvPr>
+          <p:cNvPicPr>
+            <a:picLocks noChangeAspect="1"/>
+          </p:cNvPicPr>
+          <p:nvPr/>
+        </p:nvPicPr>
+        <p:blipFill>
+          <a:blip r:embed="rId6">
+            <a:extLst>
+              <a:ext uri="{28A0092B-C50C-407E-A947-70E740481C1C}">
+                <a14:useLocalDpi xmlns:a14="http://schemas.microsoft.com/office/drawing/2010/main" val="0"/>
+              </a:ext>
+            </a:extLst>
+          </a:blip>
+          <a:stretch>
+            <a:fillRect/>
+          </a:stretch>
+        </p:blipFill>
+        <p:spPr>
+          <a:xfrm>
+            <a:off x="5147903" y="409988"/>
+            <a:ext cx="1896194" cy="912680"/>
+          </a:xfrm>
+          <a:prstGeom prst="rect">
+            <a:avLst/>
+          </a:prstGeom>
+        </p:spPr>
+      </p:pic>
+      <p:sp>
+        <p:nvSpPr>
+          <p:cNvPr id="26" name="Rechteck 25">
+            <a:extLst>
+              <a:ext uri="{FF2B5EF4-FFF2-40B4-BE49-F238E27FC236}">
+                <a16:creationId xmlns:a16="http://schemas.microsoft.com/office/drawing/2014/main" id="{B553BEA2-CC6A-4279-A928-9479A4906143}"/>
+              </a:ext>
+            </a:extLst>
+          </p:cNvPr>
+          <p:cNvSpPr/>
+          <p:nvPr/>
+        </p:nvSpPr>
+        <p:spPr>
+          <a:xfrm>
+            <a:off x="3740685" y="1237599"/>
+            <a:ext cx="4673530" cy="5423559"/>
+          </a:xfrm>
+          <a:prstGeom prst="rect">
+            <a:avLst/>
+          </a:prstGeom>
+          <a:noFill/>
+          <a:ln>
+            <a:solidFill>
+              <a:schemeClr val="tx1">
+                <a:lumMod val="95000"/>
+                <a:lumOff val="5000"/>
+              </a:schemeClr>
+            </a:solidFill>
+          </a:ln>
+        </p:spPr>
+        <p:style>
+          <a:lnRef idx="2">
+            <a:schemeClr val="accent1">
+              <a:shade val="50000"/>
+            </a:schemeClr>
+          </a:lnRef>
+          <a:fillRef idx="1">
+            <a:schemeClr val="accent1"/>
+          </a:fillRef>
+          <a:effectRef idx="0">
+            <a:schemeClr val="accent1"/>
+          </a:effectRef>
+          <a:fontRef idx="minor">
+            <a:schemeClr val="lt1"/>
+          </a:fontRef>
+        </p:style>
+        <p:txBody>
+          <a:bodyPr rtlCol="0" anchor="ctr"/>
+          <a:lstStyle/>
+          <a:p>
+            <a:pPr algn="ctr"/>
+            <a:endParaRPr lang="de-AT"/>
+          </a:p>
+        </p:txBody>
+      </p:sp>
+      <p:cxnSp>
+        <p:nvCxnSpPr>
+          <p:cNvPr id="28" name="Gerade Verbindung mit Pfeil 27">
+            <a:extLst>
+              <a:ext uri="{FF2B5EF4-FFF2-40B4-BE49-F238E27FC236}">
+                <a16:creationId xmlns:a16="http://schemas.microsoft.com/office/drawing/2014/main" id="{0A6C5913-1CE7-4142-8A20-E78247C041ED}"/>
+              </a:ext>
+            </a:extLst>
+          </p:cNvPr>
+          <p:cNvCxnSpPr/>
+          <p:nvPr/>
+        </p:nvCxnSpPr>
+        <p:spPr>
+          <a:xfrm>
+            <a:off x="4114692" y="3878401"/>
+            <a:ext cx="3925517" cy="0"/>
+          </a:xfrm>
+          <a:prstGeom prst="straightConnector1">
+            <a:avLst/>
+          </a:prstGeom>
+          <a:ln>
+            <a:headEnd type="triangle"/>
+            <a:tailEnd type="triangle"/>
+          </a:ln>
+        </p:spPr>
+        <p:style>
+          <a:lnRef idx="1">
+            <a:schemeClr val="dk1"/>
+          </a:lnRef>
+          <a:fillRef idx="0">
+            <a:schemeClr val="dk1"/>
+          </a:fillRef>
+          <a:effectRef idx="0">
+            <a:schemeClr val="dk1"/>
+          </a:effectRef>
+          <a:fontRef idx="minor">
+            <a:schemeClr val="tx1"/>
+          </a:fontRef>
+        </p:style>
+      </p:cxnSp>
+      <p:pic>
+        <p:nvPicPr>
+          <p:cNvPr id="1044" name="Picture 20" descr="Bildergebnis für Elite">
+            <a:extLst>
+              <a:ext uri="{FF2B5EF4-FFF2-40B4-BE49-F238E27FC236}">
+                <a16:creationId xmlns:a16="http://schemas.microsoft.com/office/drawing/2014/main" id="{31B6F2C0-87FA-41AF-A19E-1E81ED9834AC}"/>
+              </a:ext>
+            </a:extLst>
+          </p:cNvPr>
+          <p:cNvPicPr>
+            <a:picLocks noChangeAspect="1" noChangeArrowheads="1"/>
+          </p:cNvPicPr>
+          <p:nvPr/>
+        </p:nvPicPr>
+        <p:blipFill>
+          <a:blip r:embed="rId7">
+            <a:extLst>
+              <a:ext uri="{28A0092B-C50C-407E-A947-70E740481C1C}">
+                <a14:useLocalDpi xmlns:a14="http://schemas.microsoft.com/office/drawing/2010/main" val="0"/>
+              </a:ext>
+            </a:extLst>
+          </a:blip>
+          <a:srcRect/>
+          <a:stretch>
+            <a:fillRect/>
+          </a:stretch>
+        </p:blipFill>
+        <p:spPr bwMode="auto">
+          <a:xfrm>
+            <a:off x="7072198" y="2016417"/>
+            <a:ext cx="717091" cy="1063944"/>
+          </a:xfrm>
+          <a:prstGeom prst="rect">
+            <a:avLst/>
+          </a:prstGeom>
+          <a:noFill/>
+          <a:extLst>
+            <a:ext uri="{909E8E84-426E-40DD-AFC4-6F175D3DCCD1}">
+              <a14:hiddenFill xmlns:a14="http://schemas.microsoft.com/office/drawing/2010/main">
+                <a:solidFill>
+                  <a:srgbClr val="FFFFFF"/>
+                </a:solidFill>
+              </a14:hiddenFill>
+            </a:ext>
+          </a:extLst>
+        </p:spPr>
+      </p:pic>
+      <p:sp>
+        <p:nvSpPr>
+          <p:cNvPr id="29" name="Textfeld 28">
+            <a:extLst>
+              <a:ext uri="{FF2B5EF4-FFF2-40B4-BE49-F238E27FC236}">
+                <a16:creationId xmlns:a16="http://schemas.microsoft.com/office/drawing/2014/main" id="{734F0EFA-77A9-4627-BB2C-08ADAA46186C}"/>
+              </a:ext>
+            </a:extLst>
+          </p:cNvPr>
+          <p:cNvSpPr txBox="1"/>
+          <p:nvPr/>
+        </p:nvSpPr>
+        <p:spPr>
+          <a:xfrm>
+            <a:off x="6949440" y="3108960"/>
+            <a:ext cx="937260" cy="769441"/>
+          </a:xfrm>
+          <a:prstGeom prst="rect">
+            <a:avLst/>
+          </a:prstGeom>
+          <a:noFill/>
+        </p:spPr>
+        <p:txBody>
+          <a:bodyPr wrap="square" rtlCol="0">
+            <a:spAutoFit/>
+          </a:bodyPr>
+          <a:lstStyle/>
+          <a:p>
+            <a:pPr marL="285750" indent="-285750">
+              <a:buFont typeface="Arial" panose="020B0604020202020204" pitchFamily="34" charset="0"/>
+              <a:buChar char="•"/>
+            </a:pPr>
+            <a:r>
+              <a:rPr lang="de-AT" sz="1100" dirty="0"/>
+              <a:t>Netflix</a:t>
+            </a:r>
+          </a:p>
+          <a:p>
+            <a:pPr marL="285750" indent="-285750">
+              <a:buFont typeface="Arial" panose="020B0604020202020204" pitchFamily="34" charset="0"/>
+              <a:buChar char="•"/>
+            </a:pPr>
+            <a:endParaRPr lang="de-AT" sz="1100" dirty="0"/>
+          </a:p>
+          <a:p>
+            <a:pPr marL="285750" indent="-285750">
+              <a:buFont typeface="Arial" panose="020B0604020202020204" pitchFamily="34" charset="0"/>
+              <a:buChar char="•"/>
+            </a:pPr>
+            <a:r>
+              <a:rPr lang="de-AT" sz="1100" dirty="0"/>
+              <a:t>Drama/Krimi</a:t>
+            </a:r>
+          </a:p>
+        </p:txBody>
+      </p:sp>
+      <p:sp>
+        <p:nvSpPr>
+          <p:cNvPr id="15" name="Textfeld 14">
+            <a:extLst>
+              <a:ext uri="{FF2B5EF4-FFF2-40B4-BE49-F238E27FC236}">
+                <a16:creationId xmlns:a16="http://schemas.microsoft.com/office/drawing/2014/main" id="{2D96F575-AF4F-4B54-88CA-3D085C7F3E3A}"/>
+              </a:ext>
+            </a:extLst>
+          </p:cNvPr>
+          <p:cNvSpPr txBox="1"/>
+          <p:nvPr/>
+        </p:nvSpPr>
+        <p:spPr>
+          <a:xfrm>
+            <a:off x="5907754" y="368107"/>
+            <a:ext cx="2532318" cy="6251145"/>
+          </a:xfrm>
+          <a:prstGeom prst="rect">
+            <a:avLst/>
+          </a:prstGeom>
+          <a:solidFill>
+            <a:srgbClr val="585858"/>
+          </a:solidFill>
+          <a:ln w="28575">
+            <a:solidFill>
+              <a:schemeClr val="tx1"/>
+            </a:solidFill>
+          </a:ln>
+        </p:spPr>
+        <p:txBody>
+          <a:bodyPr wrap="square" rtlCol="0">
+            <a:spAutoFit/>
+          </a:bodyPr>
+          <a:lstStyle/>
+          <a:p>
+            <a:endParaRPr lang="de-AT" dirty="0"/>
+          </a:p>
+        </p:txBody>
+      </p:sp>
+      <p:pic>
+        <p:nvPicPr>
+          <p:cNvPr id="16" name="Grafik 15">
+            <a:extLst>
+              <a:ext uri="{FF2B5EF4-FFF2-40B4-BE49-F238E27FC236}">
+                <a16:creationId xmlns:a16="http://schemas.microsoft.com/office/drawing/2014/main" id="{C5266D2C-9282-4D29-BB50-E8E806489F24}"/>
+              </a:ext>
+            </a:extLst>
+          </p:cNvPr>
+          <p:cNvPicPr>
+            <a:picLocks noChangeAspect="1"/>
+          </p:cNvPicPr>
+          <p:nvPr/>
+        </p:nvPicPr>
+        <p:blipFill>
+          <a:blip r:embed="rId8">
+            <a:alphaModFix/>
+            <a:extLst>
+              <a:ext uri="{28A0092B-C50C-407E-A947-70E740481C1C}">
+                <a14:useLocalDpi xmlns:a14="http://schemas.microsoft.com/office/drawing/2010/main" val="0"/>
+              </a:ext>
+            </a:extLst>
+          </a:blip>
+          <a:stretch/>
+        </p:blipFill>
+        <p:spPr>
+          <a:xfrm>
+            <a:off x="3998396" y="501369"/>
+            <a:ext cx="591363" cy="634039"/>
+          </a:xfrm>
+          <a:prstGeom prst="rect">
+            <a:avLst/>
+          </a:prstGeom>
+          <a:solidFill>
+            <a:srgbClr val="494949"/>
+          </a:solidFill>
+          <a:effectLst>
+            <a:glow>
+              <a:schemeClr val="accent1">
+                <a:alpha val="65000"/>
+              </a:schemeClr>
+            </a:glow>
+          </a:effectLst>
+        </p:spPr>
+      </p:pic>
+      <p:pic>
+        <p:nvPicPr>
+          <p:cNvPr id="17" name="Grafik 16">
+            <a:extLst>
+              <a:ext uri="{FF2B5EF4-FFF2-40B4-BE49-F238E27FC236}">
+                <a16:creationId xmlns:a16="http://schemas.microsoft.com/office/drawing/2014/main" id="{488ED6D2-DBB6-4B02-804C-0176C10EA2A7}"/>
+              </a:ext>
+            </a:extLst>
+          </p:cNvPr>
+          <p:cNvPicPr>
+            <a:picLocks noChangeAspect="1"/>
+          </p:cNvPicPr>
+          <p:nvPr/>
+        </p:nvPicPr>
+        <p:blipFill>
+          <a:blip r:embed="rId9"/>
+          <a:stretch>
+            <a:fillRect/>
+          </a:stretch>
+        </p:blipFill>
+        <p:spPr>
+          <a:xfrm>
+            <a:off x="6124274" y="501369"/>
+            <a:ext cx="551518" cy="629369"/>
+          </a:xfrm>
+          <a:prstGeom prst="rect">
+            <a:avLst/>
+          </a:prstGeom>
+        </p:spPr>
+      </p:pic>
+      <p:sp>
+        <p:nvSpPr>
+          <p:cNvPr id="2" name="Textfeld 1">
+            <a:extLst>
+              <a:ext uri="{FF2B5EF4-FFF2-40B4-BE49-F238E27FC236}">
+                <a16:creationId xmlns:a16="http://schemas.microsoft.com/office/drawing/2014/main" id="{241E9749-2533-4CD8-837A-B8E58EC470A8}"/>
+              </a:ext>
+            </a:extLst>
+          </p:cNvPr>
+          <p:cNvSpPr txBox="1"/>
+          <p:nvPr/>
+        </p:nvSpPr>
+        <p:spPr>
+          <a:xfrm>
+            <a:off x="6242050" y="1322668"/>
+            <a:ext cx="1987550" cy="923330"/>
+          </a:xfrm>
+          <a:prstGeom prst="rect">
+            <a:avLst/>
+          </a:prstGeom>
+          <a:noFill/>
+        </p:spPr>
+        <p:txBody>
+          <a:bodyPr wrap="square" rtlCol="0">
+            <a:spAutoFit/>
+          </a:bodyPr>
+          <a:lstStyle/>
+          <a:p>
+            <a:pPr marL="285750" indent="-285750">
+              <a:buFont typeface="Arial" panose="020B0604020202020204" pitchFamily="34" charset="0"/>
+              <a:buChar char="•"/>
+            </a:pPr>
+            <a:r>
+              <a:rPr lang="de-AT" dirty="0"/>
+              <a:t>Amazon Prime</a:t>
+            </a:r>
+          </a:p>
+          <a:p>
+            <a:pPr marL="285750" indent="-285750">
+              <a:buFont typeface="Arial" panose="020B0604020202020204" pitchFamily="34" charset="0"/>
+              <a:buChar char="•"/>
+            </a:pPr>
+            <a:r>
+              <a:rPr lang="de-AT" dirty="0"/>
+              <a:t>Netflix</a:t>
+            </a:r>
+          </a:p>
+          <a:p>
+            <a:pPr marL="285750" indent="-285750">
+              <a:buFont typeface="Arial" panose="020B0604020202020204" pitchFamily="34" charset="0"/>
+              <a:buChar char="•"/>
+            </a:pPr>
+            <a:endParaRPr lang="de-AT" dirty="0"/>
+          </a:p>
+        </p:txBody>
+      </p:sp>
+    </p:spTree>
+    <p:extLst>
+      <p:ext uri="{BB962C8B-B14F-4D97-AF65-F5344CB8AC3E}">
+        <p14:creationId xmlns:p14="http://schemas.microsoft.com/office/powerpoint/2010/main" val="3624879499"/>
       </p:ext>
     </p:extLst>
   </p:cSld>
@@ -4891,4 +6887,299 @@
     </a:ext>
   </a:extLst>
 </a:theme>
+</file>
+
+<file path=ppt/theme/theme2.xml><?xml version="1.0" encoding="utf-8"?>
+<a:theme xmlns:a="http://schemas.openxmlformats.org/drawingml/2006/main" name="Office">
+  <a:themeElements>
+    <a:clrScheme name="Office">
+      <a:dk1>
+        <a:sysClr val="windowText" lastClr="000000"/>
+      </a:dk1>
+      <a:lt1>
+        <a:sysClr val="window" lastClr="FFFFFF"/>
+      </a:lt1>
+      <a:dk2>
+        <a:srgbClr val="44546A"/>
+      </a:dk2>
+      <a:lt2>
+        <a:srgbClr val="E7E6E6"/>
+      </a:lt2>
+      <a:accent1>
+        <a:srgbClr val="4472C4"/>
+      </a:accent1>
+      <a:accent2>
+        <a:srgbClr val="ED7D31"/>
+      </a:accent2>
+      <a:accent3>
+        <a:srgbClr val="A5A5A5"/>
+      </a:accent3>
+      <a:accent4>
+        <a:srgbClr val="FFC000"/>
+      </a:accent4>
+      <a:accent5>
+        <a:srgbClr val="5B9BD5"/>
+      </a:accent5>
+      <a:accent6>
+        <a:srgbClr val="70AD47"/>
+      </a:accent6>
+      <a:hlink>
+        <a:srgbClr val="0563C1"/>
+      </a:hlink>
+      <a:folHlink>
+        <a:srgbClr val="954F72"/>
+      </a:folHlink>
+    </a:clrScheme>
+    <a:fontScheme name="Office">
+      <a:majorFont>
+        <a:latin typeface="Calibri Light" panose="020F0302020204030204"/>
+        <a:ea typeface=""/>
+        <a:cs typeface=""/>
+        <a:font script="Jpan" typeface="游ゴシック Light"/>
+        <a:font script="Hang" typeface="맑은 고딕"/>
+        <a:font script="Hans" typeface="等线 Light"/>
+        <a:font script="Hant" typeface="新細明體"/>
+        <a:font script="Arab" typeface="Times New Roman"/>
+        <a:font script="Hebr" typeface="Times New Roman"/>
+        <a:font script="Thai" typeface="Angsana New"/>
+        <a:font script="Ethi" typeface="Nyala"/>
+        <a:font script="Beng" typeface="Vrinda"/>
+        <a:font script="Gujr" typeface="Shruti"/>
+        <a:font script="Khmr" typeface="MoolBoran"/>
+        <a:font script="Knda" typeface="Tunga"/>
+        <a:font script="Guru" typeface="Raavi"/>
+        <a:font script="Cans" typeface="Euphemia"/>
+        <a:font script="Cher" typeface="Plantagenet Cherokee"/>
+        <a:font script="Yiii" typeface="Microsoft Yi Baiti"/>
+        <a:font script="Tibt" typeface="Microsoft Himalaya"/>
+        <a:font script="Thaa" typeface="MV Boli"/>
+        <a:font script="Deva" typeface="Mangal"/>
+        <a:font script="Telu" typeface="Gautami"/>
+        <a:font script="Taml" typeface="Latha"/>
+        <a:font script="Syrc" typeface="Estrangelo Edessa"/>
+        <a:font script="Orya" typeface="Kalinga"/>
+        <a:font script="Mlym" typeface="Kartika"/>
+        <a:font script="Laoo" typeface="DokChampa"/>
+        <a:font script="Sinh" typeface="Iskoola Pota"/>
+        <a:font script="Mong" typeface="Mongolian Baiti"/>
+        <a:font script="Viet" typeface="Times New Roman"/>
+        <a:font script="Uigh" typeface="Microsoft Uighur"/>
+        <a:font script="Geor" typeface="Sylfaen"/>
+        <a:font script="Armn" typeface="Arial"/>
+        <a:font script="Bugi" typeface="Leelawadee UI"/>
+        <a:font script="Bopo" typeface="Microsoft JhengHei"/>
+        <a:font script="Java" typeface="Javanese Text"/>
+        <a:font script="Lisu" typeface="Segoe UI"/>
+        <a:font script="Mymr" typeface="Myanmar Text"/>
+        <a:font script="Nkoo" typeface="Ebrima"/>
+        <a:font script="Olck" typeface="Nirmala UI"/>
+        <a:font script="Osma" typeface="Ebrima"/>
+        <a:font script="Phag" typeface="Phagspa"/>
+        <a:font script="Syrn" typeface="Estrangelo Edessa"/>
+        <a:font script="Syrj" typeface="Estrangelo Edessa"/>
+        <a:font script="Syre" typeface="Estrangelo Edessa"/>
+        <a:font script="Sora" typeface="Nirmala UI"/>
+        <a:font script="Tale" typeface="Microsoft Tai Le"/>
+        <a:font script="Talu" typeface="Microsoft New Tai Lue"/>
+        <a:font script="Tfng" typeface="Ebrima"/>
+      </a:majorFont>
+      <a:minorFont>
+        <a:latin typeface="Calibri" panose="020F0502020204030204"/>
+        <a:ea typeface=""/>
+        <a:cs typeface=""/>
+        <a:font script="Jpan" typeface="游ゴシック"/>
+        <a:font script="Hang" typeface="맑은 고딕"/>
+        <a:font script="Hans" typeface="等线"/>
+        <a:font script="Hant" typeface="新細明體"/>
+        <a:font script="Arab" typeface="Arial"/>
+        <a:font script="Hebr" typeface="Arial"/>
+        <a:font script="Thai" typeface="Cordia New"/>
+        <a:font script="Ethi" typeface="Nyala"/>
+        <a:font script="Beng" typeface="Vrinda"/>
+        <a:font script="Gujr" typeface="Shruti"/>
+        <a:font script="Khmr" typeface="DaunPenh"/>
+        <a:font script="Knda" typeface="Tunga"/>
+        <a:font script="Guru" typeface="Raavi"/>
+        <a:font script="Cans" typeface="Euphemia"/>
+        <a:font script="Cher" typeface="Plantagenet Cherokee"/>
+        <a:font script="Yiii" typeface="Microsoft Yi Baiti"/>
+        <a:font script="Tibt" typeface="Microsoft Himalaya"/>
+        <a:font script="Thaa" typeface="MV Boli"/>
+        <a:font script="Deva" typeface="Mangal"/>
+        <a:font script="Telu" typeface="Gautami"/>
+        <a:font script="Taml" typeface="Latha"/>
+        <a:font script="Syrc" typeface="Estrangelo Edessa"/>
+        <a:font script="Orya" typeface="Kalinga"/>
+        <a:font script="Mlym" typeface="Kartika"/>
+        <a:font script="Laoo" typeface="DokChampa"/>
+        <a:font script="Sinh" typeface="Iskoola Pota"/>
+        <a:font script="Mong" typeface="Mongolian Baiti"/>
+        <a:font script="Viet" typeface="Arial"/>
+        <a:font script="Uigh" typeface="Microsoft Uighur"/>
+        <a:font script="Geor" typeface="Sylfaen"/>
+        <a:font script="Armn" typeface="Arial"/>
+        <a:font script="Bugi" typeface="Leelawadee UI"/>
+        <a:font script="Bopo" typeface="Microsoft JhengHei"/>
+        <a:font script="Java" typeface="Javanese Text"/>
+        <a:font script="Lisu" typeface="Segoe UI"/>
+        <a:font script="Mymr" typeface="Myanmar Text"/>
+        <a:font script="Nkoo" typeface="Ebrima"/>
+        <a:font script="Olck" typeface="Nirmala UI"/>
+        <a:font script="Osma" typeface="Ebrima"/>
+        <a:font script="Phag" typeface="Phagspa"/>
+        <a:font script="Syrn" typeface="Estrangelo Edessa"/>
+        <a:font script="Syrj" typeface="Estrangelo Edessa"/>
+        <a:font script="Syre" typeface="Estrangelo Edessa"/>
+        <a:font script="Sora" typeface="Nirmala UI"/>
+        <a:font script="Tale" typeface="Microsoft Tai Le"/>
+        <a:font script="Talu" typeface="Microsoft New Tai Lue"/>
+        <a:font script="Tfng" typeface="Ebrima"/>
+      </a:minorFont>
+    </a:fontScheme>
+    <a:fmtScheme name="Office">
+      <a:fillStyleLst>
+        <a:solidFill>
+          <a:schemeClr val="phClr"/>
+        </a:solidFill>
+        <a:gradFill rotWithShape="1">
+          <a:gsLst>
+            <a:gs pos="0">
+              <a:schemeClr val="phClr">
+                <a:lumMod val="110000"/>
+                <a:satMod val="105000"/>
+                <a:tint val="67000"/>
+              </a:schemeClr>
+            </a:gs>
+            <a:gs pos="50000">
+              <a:schemeClr val="phClr">
+                <a:lumMod val="105000"/>
+                <a:satMod val="103000"/>
+                <a:tint val="73000"/>
+              </a:schemeClr>
+            </a:gs>
+            <a:gs pos="100000">
+              <a:schemeClr val="phClr">
+                <a:lumMod val="105000"/>
+                <a:satMod val="109000"/>
+                <a:tint val="81000"/>
+              </a:schemeClr>
+            </a:gs>
+          </a:gsLst>
+          <a:lin ang="5400000" scaled="0"/>
+        </a:gradFill>
+        <a:gradFill rotWithShape="1">
+          <a:gsLst>
+            <a:gs pos="0">
+              <a:schemeClr val="phClr">
+                <a:satMod val="103000"/>
+                <a:lumMod val="102000"/>
+                <a:tint val="94000"/>
+              </a:schemeClr>
+            </a:gs>
+            <a:gs pos="50000">
+              <a:schemeClr val="phClr">
+                <a:satMod val="110000"/>
+                <a:lumMod val="100000"/>
+                <a:shade val="100000"/>
+              </a:schemeClr>
+            </a:gs>
+            <a:gs pos="100000">
+              <a:schemeClr val="phClr">
+                <a:lumMod val="99000"/>
+                <a:satMod val="120000"/>
+                <a:shade val="78000"/>
+              </a:schemeClr>
+            </a:gs>
+          </a:gsLst>
+          <a:lin ang="5400000" scaled="0"/>
+        </a:gradFill>
+      </a:fillStyleLst>
+      <a:lnStyleLst>
+        <a:ln w="6350" cap="flat" cmpd="sng" algn="ctr">
+          <a:solidFill>
+            <a:schemeClr val="phClr"/>
+          </a:solidFill>
+          <a:prstDash val="solid"/>
+          <a:miter lim="800000"/>
+        </a:ln>
+        <a:ln w="12700" cap="flat" cmpd="sng" algn="ctr">
+          <a:solidFill>
+            <a:schemeClr val="phClr"/>
+          </a:solidFill>
+          <a:prstDash val="solid"/>
+          <a:miter lim="800000"/>
+        </a:ln>
+        <a:ln w="19050" cap="flat" cmpd="sng" algn="ctr">
+          <a:solidFill>
+            <a:schemeClr val="phClr"/>
+          </a:solidFill>
+          <a:prstDash val="solid"/>
+          <a:miter lim="800000"/>
+        </a:ln>
+      </a:lnStyleLst>
+      <a:effectStyleLst>
+        <a:effectStyle>
+          <a:effectLst/>
+        </a:effectStyle>
+        <a:effectStyle>
+          <a:effectLst/>
+        </a:effectStyle>
+        <a:effectStyle>
+          <a:effectLst>
+            <a:outerShdw blurRad="57150" dist="19050" dir="5400000" algn="ctr" rotWithShape="0">
+              <a:srgbClr val="000000">
+                <a:alpha val="63000"/>
+              </a:srgbClr>
+            </a:outerShdw>
+          </a:effectLst>
+        </a:effectStyle>
+      </a:effectStyleLst>
+      <a:bgFillStyleLst>
+        <a:solidFill>
+          <a:schemeClr val="phClr"/>
+        </a:solidFill>
+        <a:solidFill>
+          <a:schemeClr val="phClr">
+            <a:tint val="95000"/>
+            <a:satMod val="170000"/>
+          </a:schemeClr>
+        </a:solidFill>
+        <a:gradFill rotWithShape="1">
+          <a:gsLst>
+            <a:gs pos="0">
+              <a:schemeClr val="phClr">
+                <a:tint val="93000"/>
+                <a:satMod val="150000"/>
+                <a:shade val="98000"/>
+                <a:lumMod val="102000"/>
+              </a:schemeClr>
+            </a:gs>
+            <a:gs pos="50000">
+              <a:schemeClr val="phClr">
+                <a:tint val="98000"/>
+                <a:satMod val="130000"/>
+                <a:shade val="90000"/>
+                <a:lumMod val="103000"/>
+              </a:schemeClr>
+            </a:gs>
+            <a:gs pos="100000">
+              <a:schemeClr val="phClr">
+                <a:shade val="63000"/>
+                <a:satMod val="120000"/>
+              </a:schemeClr>
+            </a:gs>
+          </a:gsLst>
+          <a:lin ang="5400000" scaled="0"/>
+        </a:gradFill>
+      </a:bgFillStyleLst>
+    </a:fmtScheme>
+  </a:themeElements>
+  <a:objectDefaults/>
+  <a:extraClrSchemeLst/>
+  <a:extLst>
+    <a:ext uri="{05A4C25C-085E-4340-85A3-A5531E510DB2}">
+      <thm15:themeFamily xmlns:thm15="http://schemas.microsoft.com/office/thememl/2012/main" name="Office Theme" id="{62F939B6-93AF-4DB8-9C6B-D6C7DFDC589F}" vid="{4A3C46E8-61CC-4603-A589-7422A47A8E4A}"/>
+    </a:ext>
+  </a:extLst>
+</a:theme>
 </file>
</xml_diff>